<commit_message>
Cohort Cuilder training powerpoint, small fixes.
</commit_message>
<xml_diff>
--- a/Documentation/Training/CohortBuilder.pptx
+++ b/Documentation/Training/CohortBuilder.pptx
@@ -5,7 +5,7 @@
     <p:sldMasterId id="2147483648" r:id="rId1"/>
   </p:sldMasterIdLst>
   <p:notesMasterIdLst>
-    <p:notesMasterId r:id="rId13"/>
+    <p:notesMasterId r:id="rId14"/>
   </p:notesMasterIdLst>
   <p:sldIdLst>
     <p:sldId id="272" r:id="rId2"/>
@@ -19,6 +19,7 @@
     <p:sldId id="278" r:id="rId10"/>
     <p:sldId id="280" r:id="rId11"/>
     <p:sldId id="279" r:id="rId12"/>
+    <p:sldId id="281" r:id="rId13"/>
   </p:sldIdLst>
   <p:sldSz cx="12192000" cy="6858000"/>
   <p:notesSz cx="6858000" cy="9144000"/>
@@ -133,6 +134,7 @@
             <p14:sldId id="278"/>
             <p14:sldId id="280"/>
             <p14:sldId id="279"/>
+            <p14:sldId id="281"/>
           </p14:sldIdLst>
         </p14:section>
         <p14:section name="Simpler workthrough" id="{DBD142CE-6DD3-4D58-9A98-F12788E9E14C}">
@@ -229,7 +231,7 @@
           <a:p>
             <a:fld id="{E6799723-5C7A-4148-A580-1582FB869D21}" type="datetimeFigureOut">
               <a:rPr lang="en-GB" smtClean="0"/>
-              <a:t>25/10/2019</a:t>
+              <a:t>20/11/2019</a:t>
             </a:fld>
             <a:endParaRPr lang="en-GB"/>
           </a:p>
@@ -799,7 +801,7 @@
           <a:p>
             <a:fld id="{A4B2E03E-B9F4-48CD-BEDC-03BA93144C1F}" type="datetimeFigureOut">
               <a:rPr lang="en-GB" smtClean="0"/>
-              <a:t>25/10/2019</a:t>
+              <a:t>20/11/2019</a:t>
             </a:fld>
             <a:endParaRPr lang="en-GB"/>
           </a:p>
@@ -969,7 +971,7 @@
           <a:p>
             <a:fld id="{A4B2E03E-B9F4-48CD-BEDC-03BA93144C1F}" type="datetimeFigureOut">
               <a:rPr lang="en-GB" smtClean="0"/>
-              <a:t>25/10/2019</a:t>
+              <a:t>20/11/2019</a:t>
             </a:fld>
             <a:endParaRPr lang="en-GB"/>
           </a:p>
@@ -1149,7 +1151,7 @@
           <a:p>
             <a:fld id="{A4B2E03E-B9F4-48CD-BEDC-03BA93144C1F}" type="datetimeFigureOut">
               <a:rPr lang="en-GB" smtClean="0"/>
-              <a:t>25/10/2019</a:t>
+              <a:t>20/11/2019</a:t>
             </a:fld>
             <a:endParaRPr lang="en-GB"/>
           </a:p>
@@ -1319,7 +1321,7 @@
           <a:p>
             <a:fld id="{A4B2E03E-B9F4-48CD-BEDC-03BA93144C1F}" type="datetimeFigureOut">
               <a:rPr lang="en-GB" smtClean="0"/>
-              <a:t>25/10/2019</a:t>
+              <a:t>20/11/2019</a:t>
             </a:fld>
             <a:endParaRPr lang="en-GB"/>
           </a:p>
@@ -1565,7 +1567,7 @@
           <a:p>
             <a:fld id="{A4B2E03E-B9F4-48CD-BEDC-03BA93144C1F}" type="datetimeFigureOut">
               <a:rPr lang="en-GB" smtClean="0"/>
-              <a:t>25/10/2019</a:t>
+              <a:t>20/11/2019</a:t>
             </a:fld>
             <a:endParaRPr lang="en-GB"/>
           </a:p>
@@ -1797,7 +1799,7 @@
           <a:p>
             <a:fld id="{A4B2E03E-B9F4-48CD-BEDC-03BA93144C1F}" type="datetimeFigureOut">
               <a:rPr lang="en-GB" smtClean="0"/>
-              <a:t>25/10/2019</a:t>
+              <a:t>20/11/2019</a:t>
             </a:fld>
             <a:endParaRPr lang="en-GB"/>
           </a:p>
@@ -2164,7 +2166,7 @@
           <a:p>
             <a:fld id="{A4B2E03E-B9F4-48CD-BEDC-03BA93144C1F}" type="datetimeFigureOut">
               <a:rPr lang="en-GB" smtClean="0"/>
-              <a:t>25/10/2019</a:t>
+              <a:t>20/11/2019</a:t>
             </a:fld>
             <a:endParaRPr lang="en-GB"/>
           </a:p>
@@ -2282,7 +2284,7 @@
           <a:p>
             <a:fld id="{A4B2E03E-B9F4-48CD-BEDC-03BA93144C1F}" type="datetimeFigureOut">
               <a:rPr lang="en-GB" smtClean="0"/>
-              <a:t>25/10/2019</a:t>
+              <a:t>20/11/2019</a:t>
             </a:fld>
             <a:endParaRPr lang="en-GB"/>
           </a:p>
@@ -2377,7 +2379,7 @@
           <a:p>
             <a:fld id="{A4B2E03E-B9F4-48CD-BEDC-03BA93144C1F}" type="datetimeFigureOut">
               <a:rPr lang="en-GB" smtClean="0"/>
-              <a:t>25/10/2019</a:t>
+              <a:t>20/11/2019</a:t>
             </a:fld>
             <a:endParaRPr lang="en-GB"/>
           </a:p>
@@ -2654,7 +2656,7 @@
           <a:p>
             <a:fld id="{A4B2E03E-B9F4-48CD-BEDC-03BA93144C1F}" type="datetimeFigureOut">
               <a:rPr lang="en-GB" smtClean="0"/>
-              <a:t>25/10/2019</a:t>
+              <a:t>20/11/2019</a:t>
             </a:fld>
             <a:endParaRPr lang="en-GB"/>
           </a:p>
@@ -2907,7 +2909,7 @@
           <a:p>
             <a:fld id="{A4B2E03E-B9F4-48CD-BEDC-03BA93144C1F}" type="datetimeFigureOut">
               <a:rPr lang="en-GB" smtClean="0"/>
-              <a:t>25/10/2019</a:t>
+              <a:t>20/11/2019</a:t>
             </a:fld>
             <a:endParaRPr lang="en-GB"/>
           </a:p>
@@ -3120,7 +3122,7 @@
           <a:p>
             <a:fld id="{A4B2E03E-B9F4-48CD-BEDC-03BA93144C1F}" type="datetimeFigureOut">
               <a:rPr lang="en-GB" smtClean="0"/>
-              <a:t>25/10/2019</a:t>
+              <a:t>20/11/2019</a:t>
             </a:fld>
             <a:endParaRPr lang="en-GB"/>
           </a:p>
@@ -4512,6 +4514,379 @@
     <p:extLst>
       <p:ext uri="{BB962C8B-B14F-4D97-AF65-F5344CB8AC3E}">
         <p14:creationId xmlns:p14="http://schemas.microsoft.com/office/powerpoint/2010/main" val="80542501"/>
+      </p:ext>
+    </p:extLst>
+  </p:cSld>
+  <p:clrMapOvr>
+    <a:masterClrMapping/>
+  </p:clrMapOvr>
+</p:sld>
+</file>
+
+<file path=ppt/slides/slide12.xml><?xml version="1.0" encoding="utf-8"?>
+<p:sld xmlns:a="http://schemas.openxmlformats.org/drawingml/2006/main" xmlns:r="http://schemas.openxmlformats.org/officeDocument/2006/relationships" xmlns:p="http://schemas.openxmlformats.org/presentationml/2006/main">
+  <p:cSld>
+    <p:spTree>
+      <p:nvGrpSpPr>
+        <p:cNvPr id="1" name=""/>
+        <p:cNvGrpSpPr/>
+        <p:nvPr/>
+      </p:nvGrpSpPr>
+      <p:grpSpPr>
+        <a:xfrm>
+          <a:off x="0" y="0"/>
+          <a:ext cx="0" cy="0"/>
+          <a:chOff x="0" y="0"/>
+          <a:chExt cx="0" cy="0"/>
+        </a:xfrm>
+      </p:grpSpPr>
+      <p:sp>
+        <p:nvSpPr>
+          <p:cNvPr id="12" name="Freeform: Shape 11">
+            <a:extLst>
+              <a:ext uri="{FF2B5EF4-FFF2-40B4-BE49-F238E27FC236}">
+                <a16:creationId xmlns:a16="http://schemas.microsoft.com/office/drawing/2014/main" id="{C1E87B48-4A71-48EF-95C8-7AD99B0B48DE}"/>
+              </a:ext>
+            </a:extLst>
+          </p:cNvPr>
+          <p:cNvSpPr/>
+          <p:nvPr/>
+        </p:nvSpPr>
+        <p:spPr>
+          <a:xfrm>
+            <a:off x="2026760" y="1234911"/>
+            <a:ext cx="7004116" cy="4084162"/>
+          </a:xfrm>
+          <a:custGeom>
+            <a:avLst/>
+            <a:gdLst>
+              <a:gd name="connsiteX0" fmla="*/ 5986021 w 7004116"/>
+              <a:gd name="connsiteY0" fmla="*/ 1524785 h 4084162"/>
+              <a:gd name="connsiteX1" fmla="*/ 7004116 w 7004116"/>
+              <a:gd name="connsiteY1" fmla="*/ 2542880 h 4084162"/>
+              <a:gd name="connsiteX2" fmla="*/ 5462834 w 7004116"/>
+              <a:gd name="connsiteY2" fmla="*/ 4084162 h 4084162"/>
+              <a:gd name="connsiteX3" fmla="*/ 5462834 w 7004116"/>
+              <a:gd name="connsiteY3" fmla="*/ 3313521 h 4084162"/>
+              <a:gd name="connsiteX4" fmla="*/ 0 w 7004116"/>
+              <a:gd name="connsiteY4" fmla="*/ 3313521 h 4084162"/>
+              <a:gd name="connsiteX5" fmla="*/ 0 w 7004116"/>
+              <a:gd name="connsiteY5" fmla="*/ 1772238 h 4084162"/>
+              <a:gd name="connsiteX6" fmla="*/ 3913075 w 7004116"/>
+              <a:gd name="connsiteY6" fmla="*/ 1772238 h 4084162"/>
+              <a:gd name="connsiteX7" fmla="*/ 3918444 w 7004116"/>
+              <a:gd name="connsiteY7" fmla="*/ 1825501 h 4084162"/>
+              <a:gd name="connsiteX8" fmla="*/ 4223215 w 7004116"/>
+              <a:gd name="connsiteY8" fmla="*/ 2073896 h 4084162"/>
+              <a:gd name="connsiteX9" fmla="*/ 5674930 w 7004116"/>
+              <a:gd name="connsiteY9" fmla="*/ 2073896 h 4084162"/>
+              <a:gd name="connsiteX10" fmla="*/ 5986021 w 7004116"/>
+              <a:gd name="connsiteY10" fmla="*/ 1762805 h 4084162"/>
+              <a:gd name="connsiteX11" fmla="*/ 4259050 w 7004116"/>
+              <a:gd name="connsiteY11" fmla="*/ 207389 h 4084162"/>
+              <a:gd name="connsiteX12" fmla="*/ 5674930 w 7004116"/>
+              <a:gd name="connsiteY12" fmla="*/ 207389 h 4084162"/>
+              <a:gd name="connsiteX13" fmla="*/ 5986021 w 7004116"/>
+              <a:gd name="connsiteY13" fmla="*/ 518480 h 4084162"/>
+              <a:gd name="connsiteX14" fmla="*/ 5986021 w 7004116"/>
+              <a:gd name="connsiteY14" fmla="*/ 1524785 h 4084162"/>
+              <a:gd name="connsiteX15" fmla="*/ 5462834 w 7004116"/>
+              <a:gd name="connsiteY15" fmla="*/ 1001597 h 4084162"/>
+              <a:gd name="connsiteX16" fmla="*/ 5462834 w 7004116"/>
+              <a:gd name="connsiteY16" fmla="*/ 1772238 h 4084162"/>
+              <a:gd name="connsiteX17" fmla="*/ 3913075 w 7004116"/>
+              <a:gd name="connsiteY17" fmla="*/ 1772238 h 4084162"/>
+              <a:gd name="connsiteX18" fmla="*/ 3912124 w 7004116"/>
+              <a:gd name="connsiteY18" fmla="*/ 1762805 h 4084162"/>
+              <a:gd name="connsiteX19" fmla="*/ 3912124 w 7004116"/>
+              <a:gd name="connsiteY19" fmla="*/ 1451814 h 4084162"/>
+              <a:gd name="connsiteX20" fmla="*/ 4016629 w 7004116"/>
+              <a:gd name="connsiteY20" fmla="*/ 1421855 h 4084162"/>
+              <a:gd name="connsiteX21" fmla="*/ 4506014 w 7004116"/>
+              <a:gd name="connsiteY21" fmla="*/ 740004 h 4084162"/>
+              <a:gd name="connsiteX22" fmla="*/ 4271325 w 7004116"/>
+              <a:gd name="connsiteY22" fmla="*/ 216742 h 4084162"/>
+              <a:gd name="connsiteX23" fmla="*/ 3704735 w 7004116"/>
+              <a:gd name="connsiteY23" fmla="*/ 0 h 4084162"/>
+              <a:gd name="connsiteX24" fmla="*/ 4152738 w 7004116"/>
+              <a:gd name="connsiteY24" fmla="*/ 126381 h 4084162"/>
+              <a:gd name="connsiteX25" fmla="*/ 4259050 w 7004116"/>
+              <a:gd name="connsiteY25" fmla="*/ 207389 h 4084162"/>
+              <a:gd name="connsiteX26" fmla="*/ 4223215 w 7004116"/>
+              <a:gd name="connsiteY26" fmla="*/ 207389 h 4084162"/>
+              <a:gd name="connsiteX27" fmla="*/ 3912124 w 7004116"/>
+              <a:gd name="connsiteY27" fmla="*/ 518480 h 4084162"/>
+              <a:gd name="connsiteX28" fmla="*/ 3912124 w 7004116"/>
+              <a:gd name="connsiteY28" fmla="*/ 1451814 h 4084162"/>
+              <a:gd name="connsiteX29" fmla="*/ 3866221 w 7004116"/>
+              <a:gd name="connsiteY29" fmla="*/ 1464974 h 4084162"/>
+              <a:gd name="connsiteX30" fmla="*/ 3704735 w 7004116"/>
+              <a:gd name="connsiteY30" fmla="*/ 1480008 h 4084162"/>
+              <a:gd name="connsiteX31" fmla="*/ 2903456 w 7004116"/>
+              <a:gd name="connsiteY31" fmla="*/ 740004 h 4084162"/>
+              <a:gd name="connsiteX32" fmla="*/ 3704735 w 7004116"/>
+              <a:gd name="connsiteY32" fmla="*/ 0 h 4084162"/>
+            </a:gdLst>
+            <a:ahLst/>
+            <a:cxnLst>
+              <a:cxn ang="0">
+                <a:pos x="connsiteX0" y="connsiteY0"/>
+              </a:cxn>
+              <a:cxn ang="0">
+                <a:pos x="connsiteX1" y="connsiteY1"/>
+              </a:cxn>
+              <a:cxn ang="0">
+                <a:pos x="connsiteX2" y="connsiteY2"/>
+              </a:cxn>
+              <a:cxn ang="0">
+                <a:pos x="connsiteX3" y="connsiteY3"/>
+              </a:cxn>
+              <a:cxn ang="0">
+                <a:pos x="connsiteX4" y="connsiteY4"/>
+              </a:cxn>
+              <a:cxn ang="0">
+                <a:pos x="connsiteX5" y="connsiteY5"/>
+              </a:cxn>
+              <a:cxn ang="0">
+                <a:pos x="connsiteX6" y="connsiteY6"/>
+              </a:cxn>
+              <a:cxn ang="0">
+                <a:pos x="connsiteX7" y="connsiteY7"/>
+              </a:cxn>
+              <a:cxn ang="0">
+                <a:pos x="connsiteX8" y="connsiteY8"/>
+              </a:cxn>
+              <a:cxn ang="0">
+                <a:pos x="connsiteX9" y="connsiteY9"/>
+              </a:cxn>
+              <a:cxn ang="0">
+                <a:pos x="connsiteX10" y="connsiteY10"/>
+              </a:cxn>
+              <a:cxn ang="0">
+                <a:pos x="connsiteX11" y="connsiteY11"/>
+              </a:cxn>
+              <a:cxn ang="0">
+                <a:pos x="connsiteX12" y="connsiteY12"/>
+              </a:cxn>
+              <a:cxn ang="0">
+                <a:pos x="connsiteX13" y="connsiteY13"/>
+              </a:cxn>
+              <a:cxn ang="0">
+                <a:pos x="connsiteX14" y="connsiteY14"/>
+              </a:cxn>
+              <a:cxn ang="0">
+                <a:pos x="connsiteX15" y="connsiteY15"/>
+              </a:cxn>
+              <a:cxn ang="0">
+                <a:pos x="connsiteX16" y="connsiteY16"/>
+              </a:cxn>
+              <a:cxn ang="0">
+                <a:pos x="connsiteX17" y="connsiteY17"/>
+              </a:cxn>
+              <a:cxn ang="0">
+                <a:pos x="connsiteX18" y="connsiteY18"/>
+              </a:cxn>
+              <a:cxn ang="0">
+                <a:pos x="connsiteX19" y="connsiteY19"/>
+              </a:cxn>
+              <a:cxn ang="0">
+                <a:pos x="connsiteX20" y="connsiteY20"/>
+              </a:cxn>
+              <a:cxn ang="0">
+                <a:pos x="connsiteX21" y="connsiteY21"/>
+              </a:cxn>
+              <a:cxn ang="0">
+                <a:pos x="connsiteX22" y="connsiteY22"/>
+              </a:cxn>
+              <a:cxn ang="0">
+                <a:pos x="connsiteX23" y="connsiteY23"/>
+              </a:cxn>
+              <a:cxn ang="0">
+                <a:pos x="connsiteX24" y="connsiteY24"/>
+              </a:cxn>
+              <a:cxn ang="0">
+                <a:pos x="connsiteX25" y="connsiteY25"/>
+              </a:cxn>
+              <a:cxn ang="0">
+                <a:pos x="connsiteX26" y="connsiteY26"/>
+              </a:cxn>
+              <a:cxn ang="0">
+                <a:pos x="connsiteX27" y="connsiteY27"/>
+              </a:cxn>
+              <a:cxn ang="0">
+                <a:pos x="connsiteX28" y="connsiteY28"/>
+              </a:cxn>
+              <a:cxn ang="0">
+                <a:pos x="connsiteX29" y="connsiteY29"/>
+              </a:cxn>
+              <a:cxn ang="0">
+                <a:pos x="connsiteX30" y="connsiteY30"/>
+              </a:cxn>
+              <a:cxn ang="0">
+                <a:pos x="connsiteX31" y="connsiteY31"/>
+              </a:cxn>
+              <a:cxn ang="0">
+                <a:pos x="connsiteX32" y="connsiteY32"/>
+              </a:cxn>
+            </a:cxnLst>
+            <a:rect l="l" t="t" r="r" b="b"/>
+            <a:pathLst>
+              <a:path w="7004116" h="4084162">
+                <a:moveTo>
+                  <a:pt x="5986021" y="1524785"/>
+                </a:moveTo>
+                <a:lnTo>
+                  <a:pt x="7004116" y="2542880"/>
+                </a:lnTo>
+                <a:lnTo>
+                  <a:pt x="5462834" y="4084162"/>
+                </a:lnTo>
+                <a:lnTo>
+                  <a:pt x="5462834" y="3313521"/>
+                </a:lnTo>
+                <a:lnTo>
+                  <a:pt x="0" y="3313521"/>
+                </a:lnTo>
+                <a:lnTo>
+                  <a:pt x="0" y="1772238"/>
+                </a:lnTo>
+                <a:lnTo>
+                  <a:pt x="3913075" y="1772238"/>
+                </a:lnTo>
+                <a:lnTo>
+                  <a:pt x="3918444" y="1825501"/>
+                </a:lnTo>
+                <a:cubicBezTo>
+                  <a:pt x="3947452" y="1967260"/>
+                  <a:pt x="4072881" y="2073896"/>
+                  <a:pt x="4223215" y="2073896"/>
+                </a:cubicBezTo>
+                <a:lnTo>
+                  <a:pt x="5674930" y="2073896"/>
+                </a:lnTo>
+                <a:cubicBezTo>
+                  <a:pt x="5846741" y="2073896"/>
+                  <a:pt x="5986021" y="1934616"/>
+                  <a:pt x="5986021" y="1762805"/>
+                </a:cubicBezTo>
+                <a:close/>
+                <a:moveTo>
+                  <a:pt x="4259050" y="207389"/>
+                </a:moveTo>
+                <a:lnTo>
+                  <a:pt x="5674930" y="207389"/>
+                </a:lnTo>
+                <a:cubicBezTo>
+                  <a:pt x="5846741" y="207389"/>
+                  <a:pt x="5986021" y="346669"/>
+                  <a:pt x="5986021" y="518480"/>
+                </a:cubicBezTo>
+                <a:lnTo>
+                  <a:pt x="5986021" y="1524785"/>
+                </a:lnTo>
+                <a:lnTo>
+                  <a:pt x="5462834" y="1001597"/>
+                </a:lnTo>
+                <a:lnTo>
+                  <a:pt x="5462834" y="1772238"/>
+                </a:lnTo>
+                <a:lnTo>
+                  <a:pt x="3913075" y="1772238"/>
+                </a:lnTo>
+                <a:lnTo>
+                  <a:pt x="3912124" y="1762805"/>
+                </a:lnTo>
+                <a:lnTo>
+                  <a:pt x="3912124" y="1451814"/>
+                </a:lnTo>
+                <a:lnTo>
+                  <a:pt x="4016629" y="1421855"/>
+                </a:lnTo>
+                <a:cubicBezTo>
+                  <a:pt x="4304220" y="1309516"/>
+                  <a:pt x="4506014" y="1046524"/>
+                  <a:pt x="4506014" y="740004"/>
+                </a:cubicBezTo>
+                <a:cubicBezTo>
+                  <a:pt x="4506014" y="535658"/>
+                  <a:pt x="4416328" y="350657"/>
+                  <a:pt x="4271325" y="216742"/>
+                </a:cubicBezTo>
+                <a:close/>
+                <a:moveTo>
+                  <a:pt x="3704735" y="0"/>
+                </a:moveTo>
+                <a:cubicBezTo>
+                  <a:pt x="3870685" y="0"/>
+                  <a:pt x="4024853" y="46591"/>
+                  <a:pt x="4152738" y="126381"/>
+                </a:cubicBezTo>
+                <a:lnTo>
+                  <a:pt x="4259050" y="207389"/>
+                </a:lnTo>
+                <a:lnTo>
+                  <a:pt x="4223215" y="207389"/>
+                </a:lnTo>
+                <a:cubicBezTo>
+                  <a:pt x="4051404" y="207389"/>
+                  <a:pt x="3912124" y="346669"/>
+                  <a:pt x="3912124" y="518480"/>
+                </a:cubicBezTo>
+                <a:lnTo>
+                  <a:pt x="3912124" y="1451814"/>
+                </a:lnTo>
+                <a:lnTo>
+                  <a:pt x="3866221" y="1464974"/>
+                </a:lnTo>
+                <a:cubicBezTo>
+                  <a:pt x="3814059" y="1474831"/>
+                  <a:pt x="3760052" y="1480008"/>
+                  <a:pt x="3704735" y="1480008"/>
+                </a:cubicBezTo>
+                <a:cubicBezTo>
+                  <a:pt x="3262201" y="1480008"/>
+                  <a:pt x="2903456" y="1148697"/>
+                  <a:pt x="2903456" y="740004"/>
+                </a:cubicBezTo>
+                <a:cubicBezTo>
+                  <a:pt x="2903456" y="331311"/>
+                  <a:pt x="3262201" y="0"/>
+                  <a:pt x="3704735" y="0"/>
+                </a:cubicBezTo>
+                <a:close/>
+              </a:path>
+            </a:pathLst>
+          </a:custGeom>
+        </p:spPr>
+        <p:style>
+          <a:lnRef idx="2">
+            <a:schemeClr val="accent1">
+              <a:shade val="50000"/>
+            </a:schemeClr>
+          </a:lnRef>
+          <a:fillRef idx="1">
+            <a:schemeClr val="accent1"/>
+          </a:fillRef>
+          <a:effectRef idx="0">
+            <a:schemeClr val="accent1"/>
+          </a:effectRef>
+          <a:fontRef idx="minor">
+            <a:schemeClr val="lt1"/>
+          </a:fontRef>
+        </p:style>
+        <p:txBody>
+          <a:bodyPr rtlCol="0" anchor="ctr"/>
+          <a:lstStyle/>
+          <a:p>
+            <a:pPr algn="ctr"/>
+            <a:endParaRPr lang="en-GB"/>
+          </a:p>
+        </p:txBody>
+      </p:sp>
+    </p:spTree>
+    <p:extLst>
+      <p:ext uri="{BB962C8B-B14F-4D97-AF65-F5344CB8AC3E}">
+        <p14:creationId xmlns:p14="http://schemas.microsoft.com/office/powerpoint/2010/main" val="817282608"/>
       </p:ext>
     </p:extLst>
   </p:cSld>
@@ -6184,6 +6559,301 @@
   <p:clrMapOvr>
     <a:masterClrMapping/>
   </p:clrMapOvr>
+  <p:timing>
+    <p:tnLst>
+      <p:par>
+        <p:cTn id="1" dur="indefinite" restart="never" nodeType="tmRoot">
+          <p:childTnLst>
+            <p:seq concurrent="1" nextAc="seek">
+              <p:cTn id="2" dur="indefinite" nodeType="mainSeq">
+                <p:childTnLst>
+                  <p:par>
+                    <p:cTn id="3" fill="hold">
+                      <p:stCondLst>
+                        <p:cond delay="indefinite"/>
+                      </p:stCondLst>
+                      <p:childTnLst>
+                        <p:par>
+                          <p:cTn id="4" fill="hold">
+                            <p:stCondLst>
+                              <p:cond delay="0"/>
+                            </p:stCondLst>
+                            <p:childTnLst>
+                              <p:par>
+                                <p:cTn id="5" presetID="10" presetClass="entr" presetSubtype="0" fill="hold" nodeType="clickEffect">
+                                  <p:stCondLst>
+                                    <p:cond delay="0"/>
+                                  </p:stCondLst>
+                                  <p:childTnLst>
+                                    <p:set>
+                                      <p:cBhvr>
+                                        <p:cTn id="6" dur="1" fill="hold">
+                                          <p:stCondLst>
+                                            <p:cond delay="0"/>
+                                          </p:stCondLst>
+                                        </p:cTn>
+                                        <p:tgtEl>
+                                          <p:spTgt spid="7"/>
+                                        </p:tgtEl>
+                                        <p:attrNameLst>
+                                          <p:attrName>style.visibility</p:attrName>
+                                        </p:attrNameLst>
+                                      </p:cBhvr>
+                                      <p:to>
+                                        <p:strVal val="visible"/>
+                                      </p:to>
+                                    </p:set>
+                                    <p:animEffect transition="in" filter="fade">
+                                      <p:cBhvr>
+                                        <p:cTn id="7" dur="500"/>
+                                        <p:tgtEl>
+                                          <p:spTgt spid="7"/>
+                                        </p:tgtEl>
+                                      </p:cBhvr>
+                                    </p:animEffect>
+                                  </p:childTnLst>
+                                </p:cTn>
+                              </p:par>
+                            </p:childTnLst>
+                          </p:cTn>
+                        </p:par>
+                      </p:childTnLst>
+                    </p:cTn>
+                  </p:par>
+                  <p:par>
+                    <p:cTn id="8" fill="hold">
+                      <p:stCondLst>
+                        <p:cond delay="indefinite"/>
+                      </p:stCondLst>
+                      <p:childTnLst>
+                        <p:par>
+                          <p:cTn id="9" fill="hold">
+                            <p:stCondLst>
+                              <p:cond delay="0"/>
+                            </p:stCondLst>
+                            <p:childTnLst>
+                              <p:par>
+                                <p:cTn id="10" presetID="10" presetClass="entr" presetSubtype="0" fill="hold" nodeType="clickEffect">
+                                  <p:stCondLst>
+                                    <p:cond delay="0"/>
+                                  </p:stCondLst>
+                                  <p:childTnLst>
+                                    <p:set>
+                                      <p:cBhvr>
+                                        <p:cTn id="11" dur="1" fill="hold">
+                                          <p:stCondLst>
+                                            <p:cond delay="0"/>
+                                          </p:stCondLst>
+                                        </p:cTn>
+                                        <p:tgtEl>
+                                          <p:spTgt spid="8"/>
+                                        </p:tgtEl>
+                                        <p:attrNameLst>
+                                          <p:attrName>style.visibility</p:attrName>
+                                        </p:attrNameLst>
+                                      </p:cBhvr>
+                                      <p:to>
+                                        <p:strVal val="visible"/>
+                                      </p:to>
+                                    </p:set>
+                                    <p:animEffect transition="in" filter="fade">
+                                      <p:cBhvr>
+                                        <p:cTn id="12" dur="500"/>
+                                        <p:tgtEl>
+                                          <p:spTgt spid="8"/>
+                                        </p:tgtEl>
+                                      </p:cBhvr>
+                                    </p:animEffect>
+                                  </p:childTnLst>
+                                </p:cTn>
+                              </p:par>
+                            </p:childTnLst>
+                          </p:cTn>
+                        </p:par>
+                      </p:childTnLst>
+                    </p:cTn>
+                  </p:par>
+                  <p:par>
+                    <p:cTn id="13" fill="hold">
+                      <p:stCondLst>
+                        <p:cond delay="indefinite"/>
+                      </p:stCondLst>
+                      <p:childTnLst>
+                        <p:par>
+                          <p:cTn id="14" fill="hold">
+                            <p:stCondLst>
+                              <p:cond delay="0"/>
+                            </p:stCondLst>
+                            <p:childTnLst>
+                              <p:par>
+                                <p:cTn id="15" presetID="10" presetClass="entr" presetSubtype="0" fill="hold" nodeType="clickEffect">
+                                  <p:stCondLst>
+                                    <p:cond delay="0"/>
+                                  </p:stCondLst>
+                                  <p:childTnLst>
+                                    <p:set>
+                                      <p:cBhvr>
+                                        <p:cTn id="16" dur="1" fill="hold">
+                                          <p:stCondLst>
+                                            <p:cond delay="0"/>
+                                          </p:stCondLst>
+                                        </p:cTn>
+                                        <p:tgtEl>
+                                          <p:spTgt spid="14"/>
+                                        </p:tgtEl>
+                                        <p:attrNameLst>
+                                          <p:attrName>style.visibility</p:attrName>
+                                        </p:attrNameLst>
+                                      </p:cBhvr>
+                                      <p:to>
+                                        <p:strVal val="visible"/>
+                                      </p:to>
+                                    </p:set>
+                                    <p:animEffect transition="in" filter="fade">
+                                      <p:cBhvr>
+                                        <p:cTn id="17" dur="500"/>
+                                        <p:tgtEl>
+                                          <p:spTgt spid="14"/>
+                                        </p:tgtEl>
+                                      </p:cBhvr>
+                                    </p:animEffect>
+                                  </p:childTnLst>
+                                </p:cTn>
+                              </p:par>
+                            </p:childTnLst>
+                          </p:cTn>
+                        </p:par>
+                      </p:childTnLst>
+                    </p:cTn>
+                  </p:par>
+                  <p:par>
+                    <p:cTn id="18" fill="hold">
+                      <p:stCondLst>
+                        <p:cond delay="indefinite"/>
+                      </p:stCondLst>
+                      <p:childTnLst>
+                        <p:par>
+                          <p:cTn id="19" fill="hold">
+                            <p:stCondLst>
+                              <p:cond delay="0"/>
+                            </p:stCondLst>
+                            <p:childTnLst>
+                              <p:par>
+                                <p:cTn id="20" presetID="10" presetClass="entr" presetSubtype="0" fill="hold" nodeType="clickEffect">
+                                  <p:stCondLst>
+                                    <p:cond delay="0"/>
+                                  </p:stCondLst>
+                                  <p:childTnLst>
+                                    <p:set>
+                                      <p:cBhvr>
+                                        <p:cTn id="21" dur="1" fill="hold">
+                                          <p:stCondLst>
+                                            <p:cond delay="0"/>
+                                          </p:stCondLst>
+                                        </p:cTn>
+                                        <p:tgtEl>
+                                          <p:spTgt spid="19"/>
+                                        </p:tgtEl>
+                                        <p:attrNameLst>
+                                          <p:attrName>style.visibility</p:attrName>
+                                        </p:attrNameLst>
+                                      </p:cBhvr>
+                                      <p:to>
+                                        <p:strVal val="visible"/>
+                                      </p:to>
+                                    </p:set>
+                                    <p:animEffect transition="in" filter="fade">
+                                      <p:cBhvr>
+                                        <p:cTn id="22" dur="500"/>
+                                        <p:tgtEl>
+                                          <p:spTgt spid="19"/>
+                                        </p:tgtEl>
+                                      </p:cBhvr>
+                                    </p:animEffect>
+                                  </p:childTnLst>
+                                </p:cTn>
+                              </p:par>
+                            </p:childTnLst>
+                          </p:cTn>
+                        </p:par>
+                      </p:childTnLst>
+                    </p:cTn>
+                  </p:par>
+                  <p:par>
+                    <p:cTn id="23" fill="hold">
+                      <p:stCondLst>
+                        <p:cond delay="indefinite"/>
+                      </p:stCondLst>
+                      <p:childTnLst>
+                        <p:par>
+                          <p:cTn id="24" fill="hold">
+                            <p:stCondLst>
+                              <p:cond delay="0"/>
+                            </p:stCondLst>
+                            <p:childTnLst>
+                              <p:par>
+                                <p:cTn id="25" presetID="10" presetClass="entr" presetSubtype="0" fill="hold" nodeType="clickEffect">
+                                  <p:stCondLst>
+                                    <p:cond delay="0"/>
+                                  </p:stCondLst>
+                                  <p:childTnLst>
+                                    <p:set>
+                                      <p:cBhvr>
+                                        <p:cTn id="26" dur="1" fill="hold">
+                                          <p:stCondLst>
+                                            <p:cond delay="0"/>
+                                          </p:stCondLst>
+                                        </p:cTn>
+                                        <p:tgtEl>
+                                          <p:spTgt spid="24"/>
+                                        </p:tgtEl>
+                                        <p:attrNameLst>
+                                          <p:attrName>style.visibility</p:attrName>
+                                        </p:attrNameLst>
+                                      </p:cBhvr>
+                                      <p:to>
+                                        <p:strVal val="visible"/>
+                                      </p:to>
+                                    </p:set>
+                                    <p:animEffect transition="in" filter="fade">
+                                      <p:cBhvr>
+                                        <p:cTn id="27" dur="500"/>
+                                        <p:tgtEl>
+                                          <p:spTgt spid="24"/>
+                                        </p:tgtEl>
+                                      </p:cBhvr>
+                                    </p:animEffect>
+                                  </p:childTnLst>
+                                </p:cTn>
+                              </p:par>
+                            </p:childTnLst>
+                          </p:cTn>
+                        </p:par>
+                      </p:childTnLst>
+                    </p:cTn>
+                  </p:par>
+                </p:childTnLst>
+              </p:cTn>
+              <p:prevCondLst>
+                <p:cond evt="onPrev" delay="0">
+                  <p:tgtEl>
+                    <p:sldTgt/>
+                  </p:tgtEl>
+                </p:cond>
+              </p:prevCondLst>
+              <p:nextCondLst>
+                <p:cond evt="onNext" delay="0">
+                  <p:tgtEl>
+                    <p:sldTgt/>
+                  </p:tgtEl>
+                </p:cond>
+              </p:nextCondLst>
+            </p:seq>
+          </p:childTnLst>
+        </p:cTn>
+      </p:par>
+    </p:tnLst>
+  </p:timing>
 </p:sld>
 </file>
 
@@ -6842,6 +7512,248 @@
   <p:clrMapOvr>
     <a:masterClrMapping/>
   </p:clrMapOvr>
+  <p:timing>
+    <p:tnLst>
+      <p:par>
+        <p:cTn id="1" dur="indefinite" restart="never" nodeType="tmRoot">
+          <p:childTnLst>
+            <p:seq concurrent="1" nextAc="seek">
+              <p:cTn id="2" dur="indefinite" nodeType="mainSeq">
+                <p:childTnLst>
+                  <p:par>
+                    <p:cTn id="3" fill="hold">
+                      <p:stCondLst>
+                        <p:cond delay="indefinite"/>
+                      </p:stCondLst>
+                      <p:childTnLst>
+                        <p:par>
+                          <p:cTn id="4" fill="hold">
+                            <p:stCondLst>
+                              <p:cond delay="0"/>
+                            </p:stCondLst>
+                            <p:childTnLst>
+                              <p:par>
+                                <p:cTn id="5" presetID="10" presetClass="entr" presetSubtype="0" fill="hold" nodeType="clickEffect">
+                                  <p:stCondLst>
+                                    <p:cond delay="0"/>
+                                  </p:stCondLst>
+                                  <p:childTnLst>
+                                    <p:set>
+                                      <p:cBhvr>
+                                        <p:cTn id="6" dur="1" fill="hold">
+                                          <p:stCondLst>
+                                            <p:cond delay="0"/>
+                                          </p:stCondLst>
+                                        </p:cTn>
+                                        <p:tgtEl>
+                                          <p:spTgt spid="5"/>
+                                        </p:tgtEl>
+                                        <p:attrNameLst>
+                                          <p:attrName>style.visibility</p:attrName>
+                                        </p:attrNameLst>
+                                      </p:cBhvr>
+                                      <p:to>
+                                        <p:strVal val="visible"/>
+                                      </p:to>
+                                    </p:set>
+                                    <p:animEffect transition="in" filter="fade">
+                                      <p:cBhvr>
+                                        <p:cTn id="7" dur="500"/>
+                                        <p:tgtEl>
+                                          <p:spTgt spid="5"/>
+                                        </p:tgtEl>
+                                      </p:cBhvr>
+                                    </p:animEffect>
+                                  </p:childTnLst>
+                                </p:cTn>
+                              </p:par>
+                            </p:childTnLst>
+                          </p:cTn>
+                        </p:par>
+                      </p:childTnLst>
+                    </p:cTn>
+                  </p:par>
+                  <p:par>
+                    <p:cTn id="8" fill="hold">
+                      <p:stCondLst>
+                        <p:cond delay="indefinite"/>
+                      </p:stCondLst>
+                      <p:childTnLst>
+                        <p:par>
+                          <p:cTn id="9" fill="hold">
+                            <p:stCondLst>
+                              <p:cond delay="0"/>
+                            </p:stCondLst>
+                            <p:childTnLst>
+                              <p:par>
+                                <p:cTn id="10" presetID="10" presetClass="entr" presetSubtype="0" fill="hold" nodeType="clickEffect">
+                                  <p:stCondLst>
+                                    <p:cond delay="0"/>
+                                  </p:stCondLst>
+                                  <p:childTnLst>
+                                    <p:set>
+                                      <p:cBhvr>
+                                        <p:cTn id="11" dur="1" fill="hold">
+                                          <p:stCondLst>
+                                            <p:cond delay="0"/>
+                                          </p:stCondLst>
+                                        </p:cTn>
+                                        <p:tgtEl>
+                                          <p:spTgt spid="17"/>
+                                        </p:tgtEl>
+                                        <p:attrNameLst>
+                                          <p:attrName>style.visibility</p:attrName>
+                                        </p:attrNameLst>
+                                      </p:cBhvr>
+                                      <p:to>
+                                        <p:strVal val="visible"/>
+                                      </p:to>
+                                    </p:set>
+                                    <p:animEffect transition="in" filter="fade">
+                                      <p:cBhvr>
+                                        <p:cTn id="12" dur="500"/>
+                                        <p:tgtEl>
+                                          <p:spTgt spid="17"/>
+                                        </p:tgtEl>
+                                      </p:cBhvr>
+                                    </p:animEffect>
+                                  </p:childTnLst>
+                                </p:cTn>
+                              </p:par>
+                            </p:childTnLst>
+                          </p:cTn>
+                        </p:par>
+                      </p:childTnLst>
+                    </p:cTn>
+                  </p:par>
+                  <p:par>
+                    <p:cTn id="13" fill="hold">
+                      <p:stCondLst>
+                        <p:cond delay="indefinite"/>
+                      </p:stCondLst>
+                      <p:childTnLst>
+                        <p:par>
+                          <p:cTn id="14" fill="hold">
+                            <p:stCondLst>
+                              <p:cond delay="0"/>
+                            </p:stCondLst>
+                            <p:childTnLst>
+                              <p:par>
+                                <p:cTn id="15" presetID="10" presetClass="entr" presetSubtype="0" fill="hold" nodeType="clickEffect">
+                                  <p:stCondLst>
+                                    <p:cond delay="0"/>
+                                  </p:stCondLst>
+                                  <p:childTnLst>
+                                    <p:set>
+                                      <p:cBhvr>
+                                        <p:cTn id="16" dur="1" fill="hold">
+                                          <p:stCondLst>
+                                            <p:cond delay="0"/>
+                                          </p:stCondLst>
+                                        </p:cTn>
+                                        <p:tgtEl>
+                                          <p:spTgt spid="8"/>
+                                        </p:tgtEl>
+                                        <p:attrNameLst>
+                                          <p:attrName>style.visibility</p:attrName>
+                                        </p:attrNameLst>
+                                      </p:cBhvr>
+                                      <p:to>
+                                        <p:strVal val="visible"/>
+                                      </p:to>
+                                    </p:set>
+                                    <p:animEffect transition="in" filter="fade">
+                                      <p:cBhvr>
+                                        <p:cTn id="17" dur="500"/>
+                                        <p:tgtEl>
+                                          <p:spTgt spid="8"/>
+                                        </p:tgtEl>
+                                      </p:cBhvr>
+                                    </p:animEffect>
+                                  </p:childTnLst>
+                                </p:cTn>
+                              </p:par>
+                            </p:childTnLst>
+                          </p:cTn>
+                        </p:par>
+                      </p:childTnLst>
+                    </p:cTn>
+                  </p:par>
+                  <p:par>
+                    <p:cTn id="18" fill="hold">
+                      <p:stCondLst>
+                        <p:cond delay="indefinite"/>
+                      </p:stCondLst>
+                      <p:childTnLst>
+                        <p:par>
+                          <p:cTn id="19" fill="hold">
+                            <p:stCondLst>
+                              <p:cond delay="0"/>
+                            </p:stCondLst>
+                            <p:childTnLst>
+                              <p:par>
+                                <p:cTn id="20" presetID="10" presetClass="entr" presetSubtype="0" fill="hold" nodeType="clickEffect">
+                                  <p:stCondLst>
+                                    <p:cond delay="0"/>
+                                  </p:stCondLst>
+                                  <p:childTnLst>
+                                    <p:set>
+                                      <p:cBhvr>
+                                        <p:cTn id="21" dur="1" fill="hold">
+                                          <p:stCondLst>
+                                            <p:cond delay="0"/>
+                                          </p:stCondLst>
+                                        </p:cTn>
+                                        <p:tgtEl>
+                                          <p:spTgt spid="14"/>
+                                        </p:tgtEl>
+                                        <p:attrNameLst>
+                                          <p:attrName>style.visibility</p:attrName>
+                                        </p:attrNameLst>
+                                      </p:cBhvr>
+                                      <p:to>
+                                        <p:strVal val="visible"/>
+                                      </p:to>
+                                    </p:set>
+                                    <p:animEffect transition="in" filter="fade">
+                                      <p:cBhvr>
+                                        <p:cTn id="22" dur="500"/>
+                                        <p:tgtEl>
+                                          <p:spTgt spid="14"/>
+                                        </p:tgtEl>
+                                      </p:cBhvr>
+                                    </p:animEffect>
+                                  </p:childTnLst>
+                                </p:cTn>
+                              </p:par>
+                            </p:childTnLst>
+                          </p:cTn>
+                        </p:par>
+                      </p:childTnLst>
+                    </p:cTn>
+                  </p:par>
+                </p:childTnLst>
+              </p:cTn>
+              <p:prevCondLst>
+                <p:cond evt="onPrev" delay="0">
+                  <p:tgtEl>
+                    <p:sldTgt/>
+                  </p:tgtEl>
+                </p:cond>
+              </p:prevCondLst>
+              <p:nextCondLst>
+                <p:cond evt="onNext" delay="0">
+                  <p:tgtEl>
+                    <p:sldTgt/>
+                  </p:tgtEl>
+                </p:cond>
+              </p:nextCondLst>
+            </p:seq>
+          </p:childTnLst>
+        </p:cTn>
+      </p:par>
+    </p:tnLst>
+  </p:timing>
 </p:sld>
 </file>
 
@@ -9719,6 +10631,59 @@
                       </p:childTnLst>
                     </p:cTn>
                   </p:par>
+                  <p:par>
+                    <p:cTn id="23" fill="hold">
+                      <p:stCondLst>
+                        <p:cond delay="indefinite"/>
+                      </p:stCondLst>
+                      <p:childTnLst>
+                        <p:par>
+                          <p:cTn id="24" fill="hold">
+                            <p:stCondLst>
+                              <p:cond delay="0"/>
+                            </p:stCondLst>
+                            <p:childTnLst>
+                              <p:par>
+                                <p:cTn id="25" presetID="10" presetClass="entr" presetSubtype="0" fill="hold" nodeType="clickEffect">
+                                  <p:stCondLst>
+                                    <p:cond delay="0"/>
+                                  </p:stCondLst>
+                                  <p:childTnLst>
+                                    <p:set>
+                                      <p:cBhvr>
+                                        <p:cTn id="26" dur="1" fill="hold">
+                                          <p:stCondLst>
+                                            <p:cond delay="0"/>
+                                          </p:stCondLst>
+                                        </p:cTn>
+                                        <p:tgtEl>
+                                          <p:spTgt spid="63"/>
+                                        </p:tgtEl>
+                                        <p:attrNameLst>
+                                          <p:attrName>style.visibility</p:attrName>
+                                        </p:attrNameLst>
+                                      </p:cBhvr>
+                                      <p:to>
+                                        <p:strVal val="visible"/>
+                                      </p:to>
+                                    </p:set>
+                                    <p:animEffect transition="in" filter="fade">
+                                      <p:cBhvr>
+                                        <p:cTn id="27" dur="500"/>
+                                        <p:tgtEl>
+                                          <p:spTgt spid="63"/>
+                                        </p:tgtEl>
+                                      </p:cBhvr>
+                                    </p:animEffect>
+                                  </p:childTnLst>
+                                </p:cTn>
+                              </p:par>
+                            </p:childTnLst>
+                          </p:cTn>
+                        </p:par>
+                      </p:childTnLst>
+                    </p:cTn>
+                  </p:par>
                 </p:childTnLst>
               </p:cTn>
               <p:prevCondLst>
@@ -11138,6 +12103,663 @@
   <p:clrMapOvr>
     <a:masterClrMapping/>
   </p:clrMapOvr>
+  <p:timing>
+    <p:tnLst>
+      <p:par>
+        <p:cTn id="1" dur="indefinite" restart="never" nodeType="tmRoot">
+          <p:childTnLst>
+            <p:seq concurrent="1" nextAc="seek">
+              <p:cTn id="2" dur="indefinite" nodeType="mainSeq">
+                <p:childTnLst>
+                  <p:par>
+                    <p:cTn id="3" fill="hold">
+                      <p:stCondLst>
+                        <p:cond delay="indefinite"/>
+                      </p:stCondLst>
+                      <p:childTnLst>
+                        <p:par>
+                          <p:cTn id="4" fill="hold">
+                            <p:stCondLst>
+                              <p:cond delay="0"/>
+                            </p:stCondLst>
+                            <p:childTnLst>
+                              <p:par>
+                                <p:cTn id="5" presetID="10" presetClass="entr" presetSubtype="0" fill="hold" grpId="0" nodeType="clickEffect">
+                                  <p:stCondLst>
+                                    <p:cond delay="0"/>
+                                  </p:stCondLst>
+                                  <p:childTnLst>
+                                    <p:set>
+                                      <p:cBhvr>
+                                        <p:cTn id="6" dur="1" fill="hold">
+                                          <p:stCondLst>
+                                            <p:cond delay="0"/>
+                                          </p:stCondLst>
+                                        </p:cTn>
+                                        <p:tgtEl>
+                                          <p:spTgt spid="4">
+                                            <p:txEl>
+                                              <p:pRg st="0" end="0"/>
+                                            </p:txEl>
+                                          </p:spTgt>
+                                        </p:tgtEl>
+                                        <p:attrNameLst>
+                                          <p:attrName>style.visibility</p:attrName>
+                                        </p:attrNameLst>
+                                      </p:cBhvr>
+                                      <p:to>
+                                        <p:strVal val="visible"/>
+                                      </p:to>
+                                    </p:set>
+                                    <p:animEffect transition="in" filter="fade">
+                                      <p:cBhvr>
+                                        <p:cTn id="7" dur="500"/>
+                                        <p:tgtEl>
+                                          <p:spTgt spid="4">
+                                            <p:txEl>
+                                              <p:pRg st="0" end="0"/>
+                                            </p:txEl>
+                                          </p:spTgt>
+                                        </p:tgtEl>
+                                      </p:cBhvr>
+                                    </p:animEffect>
+                                  </p:childTnLst>
+                                </p:cTn>
+                              </p:par>
+                              <p:par>
+                                <p:cTn id="8" presetID="10" presetClass="entr" presetSubtype="0" fill="hold" grpId="0" nodeType="withEffect">
+                                  <p:stCondLst>
+                                    <p:cond delay="0"/>
+                                  </p:stCondLst>
+                                  <p:childTnLst>
+                                    <p:set>
+                                      <p:cBhvr>
+                                        <p:cTn id="9" dur="1" fill="hold">
+                                          <p:stCondLst>
+                                            <p:cond delay="0"/>
+                                          </p:stCondLst>
+                                        </p:cTn>
+                                        <p:tgtEl>
+                                          <p:spTgt spid="4">
+                                            <p:txEl>
+                                              <p:pRg st="1" end="1"/>
+                                            </p:txEl>
+                                          </p:spTgt>
+                                        </p:tgtEl>
+                                        <p:attrNameLst>
+                                          <p:attrName>style.visibility</p:attrName>
+                                        </p:attrNameLst>
+                                      </p:cBhvr>
+                                      <p:to>
+                                        <p:strVal val="visible"/>
+                                      </p:to>
+                                    </p:set>
+                                    <p:animEffect transition="in" filter="fade">
+                                      <p:cBhvr>
+                                        <p:cTn id="10" dur="500"/>
+                                        <p:tgtEl>
+                                          <p:spTgt spid="4">
+                                            <p:txEl>
+                                              <p:pRg st="1" end="1"/>
+                                            </p:txEl>
+                                          </p:spTgt>
+                                        </p:tgtEl>
+                                      </p:cBhvr>
+                                    </p:animEffect>
+                                  </p:childTnLst>
+                                </p:cTn>
+                              </p:par>
+                            </p:childTnLst>
+                          </p:cTn>
+                        </p:par>
+                      </p:childTnLst>
+                    </p:cTn>
+                  </p:par>
+                  <p:par>
+                    <p:cTn id="11" fill="hold">
+                      <p:stCondLst>
+                        <p:cond delay="indefinite"/>
+                      </p:stCondLst>
+                      <p:childTnLst>
+                        <p:par>
+                          <p:cTn id="12" fill="hold">
+                            <p:stCondLst>
+                              <p:cond delay="0"/>
+                            </p:stCondLst>
+                            <p:childTnLst>
+                              <p:par>
+                                <p:cTn id="13" presetID="10" presetClass="entr" presetSubtype="0" fill="hold" grpId="0" nodeType="clickEffect">
+                                  <p:stCondLst>
+                                    <p:cond delay="0"/>
+                                  </p:stCondLst>
+                                  <p:childTnLst>
+                                    <p:set>
+                                      <p:cBhvr>
+                                        <p:cTn id="14" dur="1" fill="hold">
+                                          <p:stCondLst>
+                                            <p:cond delay="0"/>
+                                          </p:stCondLst>
+                                        </p:cTn>
+                                        <p:tgtEl>
+                                          <p:spTgt spid="4">
+                                            <p:txEl>
+                                              <p:pRg st="2" end="2"/>
+                                            </p:txEl>
+                                          </p:spTgt>
+                                        </p:tgtEl>
+                                        <p:attrNameLst>
+                                          <p:attrName>style.visibility</p:attrName>
+                                        </p:attrNameLst>
+                                      </p:cBhvr>
+                                      <p:to>
+                                        <p:strVal val="visible"/>
+                                      </p:to>
+                                    </p:set>
+                                    <p:animEffect transition="in" filter="fade">
+                                      <p:cBhvr>
+                                        <p:cTn id="15" dur="500"/>
+                                        <p:tgtEl>
+                                          <p:spTgt spid="4">
+                                            <p:txEl>
+                                              <p:pRg st="2" end="2"/>
+                                            </p:txEl>
+                                          </p:spTgt>
+                                        </p:tgtEl>
+                                      </p:cBhvr>
+                                    </p:animEffect>
+                                  </p:childTnLst>
+                                </p:cTn>
+                              </p:par>
+                              <p:par>
+                                <p:cTn id="16" presetID="10" presetClass="entr" presetSubtype="0" fill="hold" grpId="0" nodeType="withEffect">
+                                  <p:stCondLst>
+                                    <p:cond delay="0"/>
+                                  </p:stCondLst>
+                                  <p:childTnLst>
+                                    <p:set>
+                                      <p:cBhvr>
+                                        <p:cTn id="17" dur="1" fill="hold">
+                                          <p:stCondLst>
+                                            <p:cond delay="0"/>
+                                          </p:stCondLst>
+                                        </p:cTn>
+                                        <p:tgtEl>
+                                          <p:spTgt spid="4">
+                                            <p:txEl>
+                                              <p:pRg st="3" end="3"/>
+                                            </p:txEl>
+                                          </p:spTgt>
+                                        </p:tgtEl>
+                                        <p:attrNameLst>
+                                          <p:attrName>style.visibility</p:attrName>
+                                        </p:attrNameLst>
+                                      </p:cBhvr>
+                                      <p:to>
+                                        <p:strVal val="visible"/>
+                                      </p:to>
+                                    </p:set>
+                                    <p:animEffect transition="in" filter="fade">
+                                      <p:cBhvr>
+                                        <p:cTn id="18" dur="500"/>
+                                        <p:tgtEl>
+                                          <p:spTgt spid="4">
+                                            <p:txEl>
+                                              <p:pRg st="3" end="3"/>
+                                            </p:txEl>
+                                          </p:spTgt>
+                                        </p:tgtEl>
+                                      </p:cBhvr>
+                                    </p:animEffect>
+                                  </p:childTnLst>
+                                </p:cTn>
+                              </p:par>
+                            </p:childTnLst>
+                          </p:cTn>
+                        </p:par>
+                      </p:childTnLst>
+                    </p:cTn>
+                  </p:par>
+                  <p:par>
+                    <p:cTn id="19" fill="hold">
+                      <p:stCondLst>
+                        <p:cond delay="indefinite"/>
+                      </p:stCondLst>
+                      <p:childTnLst>
+                        <p:par>
+                          <p:cTn id="20" fill="hold">
+                            <p:stCondLst>
+                              <p:cond delay="0"/>
+                            </p:stCondLst>
+                            <p:childTnLst>
+                              <p:par>
+                                <p:cTn id="21" presetID="10" presetClass="entr" presetSubtype="0" fill="hold" grpId="0" nodeType="clickEffect">
+                                  <p:stCondLst>
+                                    <p:cond delay="0"/>
+                                  </p:stCondLst>
+                                  <p:childTnLst>
+                                    <p:set>
+                                      <p:cBhvr>
+                                        <p:cTn id="22" dur="1" fill="hold">
+                                          <p:stCondLst>
+                                            <p:cond delay="0"/>
+                                          </p:stCondLst>
+                                        </p:cTn>
+                                        <p:tgtEl>
+                                          <p:spTgt spid="4">
+                                            <p:txEl>
+                                              <p:pRg st="4" end="4"/>
+                                            </p:txEl>
+                                          </p:spTgt>
+                                        </p:tgtEl>
+                                        <p:attrNameLst>
+                                          <p:attrName>style.visibility</p:attrName>
+                                        </p:attrNameLst>
+                                      </p:cBhvr>
+                                      <p:to>
+                                        <p:strVal val="visible"/>
+                                      </p:to>
+                                    </p:set>
+                                    <p:animEffect transition="in" filter="fade">
+                                      <p:cBhvr>
+                                        <p:cTn id="23" dur="500"/>
+                                        <p:tgtEl>
+                                          <p:spTgt spid="4">
+                                            <p:txEl>
+                                              <p:pRg st="4" end="4"/>
+                                            </p:txEl>
+                                          </p:spTgt>
+                                        </p:tgtEl>
+                                      </p:cBhvr>
+                                    </p:animEffect>
+                                  </p:childTnLst>
+                                </p:cTn>
+                              </p:par>
+                              <p:par>
+                                <p:cTn id="24" presetID="10" presetClass="entr" presetSubtype="0" fill="hold" grpId="0" nodeType="withEffect">
+                                  <p:stCondLst>
+                                    <p:cond delay="0"/>
+                                  </p:stCondLst>
+                                  <p:childTnLst>
+                                    <p:set>
+                                      <p:cBhvr>
+                                        <p:cTn id="25" dur="1" fill="hold">
+                                          <p:stCondLst>
+                                            <p:cond delay="0"/>
+                                          </p:stCondLst>
+                                        </p:cTn>
+                                        <p:tgtEl>
+                                          <p:spTgt spid="4">
+                                            <p:txEl>
+                                              <p:pRg st="5" end="5"/>
+                                            </p:txEl>
+                                          </p:spTgt>
+                                        </p:tgtEl>
+                                        <p:attrNameLst>
+                                          <p:attrName>style.visibility</p:attrName>
+                                        </p:attrNameLst>
+                                      </p:cBhvr>
+                                      <p:to>
+                                        <p:strVal val="visible"/>
+                                      </p:to>
+                                    </p:set>
+                                    <p:animEffect transition="in" filter="fade">
+                                      <p:cBhvr>
+                                        <p:cTn id="26" dur="500"/>
+                                        <p:tgtEl>
+                                          <p:spTgt spid="4">
+                                            <p:txEl>
+                                              <p:pRg st="5" end="5"/>
+                                            </p:txEl>
+                                          </p:spTgt>
+                                        </p:tgtEl>
+                                      </p:cBhvr>
+                                    </p:animEffect>
+                                  </p:childTnLst>
+                                </p:cTn>
+                              </p:par>
+                            </p:childTnLst>
+                          </p:cTn>
+                        </p:par>
+                      </p:childTnLst>
+                    </p:cTn>
+                  </p:par>
+                  <p:par>
+                    <p:cTn id="27" fill="hold">
+                      <p:stCondLst>
+                        <p:cond delay="indefinite"/>
+                      </p:stCondLst>
+                      <p:childTnLst>
+                        <p:par>
+                          <p:cTn id="28" fill="hold">
+                            <p:stCondLst>
+                              <p:cond delay="0"/>
+                            </p:stCondLst>
+                            <p:childTnLst>
+                              <p:par>
+                                <p:cTn id="29" presetID="10" presetClass="entr" presetSubtype="0" fill="hold" grpId="0" nodeType="clickEffect">
+                                  <p:stCondLst>
+                                    <p:cond delay="0"/>
+                                  </p:stCondLst>
+                                  <p:childTnLst>
+                                    <p:set>
+                                      <p:cBhvr>
+                                        <p:cTn id="30" dur="1" fill="hold">
+                                          <p:stCondLst>
+                                            <p:cond delay="0"/>
+                                          </p:stCondLst>
+                                        </p:cTn>
+                                        <p:tgtEl>
+                                          <p:spTgt spid="4">
+                                            <p:txEl>
+                                              <p:pRg st="6" end="6"/>
+                                            </p:txEl>
+                                          </p:spTgt>
+                                        </p:tgtEl>
+                                        <p:attrNameLst>
+                                          <p:attrName>style.visibility</p:attrName>
+                                        </p:attrNameLst>
+                                      </p:cBhvr>
+                                      <p:to>
+                                        <p:strVal val="visible"/>
+                                      </p:to>
+                                    </p:set>
+                                    <p:animEffect transition="in" filter="fade">
+                                      <p:cBhvr>
+                                        <p:cTn id="31" dur="500"/>
+                                        <p:tgtEl>
+                                          <p:spTgt spid="4">
+                                            <p:txEl>
+                                              <p:pRg st="6" end="6"/>
+                                            </p:txEl>
+                                          </p:spTgt>
+                                        </p:tgtEl>
+                                      </p:cBhvr>
+                                    </p:animEffect>
+                                  </p:childTnLst>
+                                </p:cTn>
+                              </p:par>
+                              <p:par>
+                                <p:cTn id="32" presetID="10" presetClass="entr" presetSubtype="0" fill="hold" grpId="0" nodeType="withEffect">
+                                  <p:stCondLst>
+                                    <p:cond delay="0"/>
+                                  </p:stCondLst>
+                                  <p:childTnLst>
+                                    <p:set>
+                                      <p:cBhvr>
+                                        <p:cTn id="33" dur="1" fill="hold">
+                                          <p:stCondLst>
+                                            <p:cond delay="0"/>
+                                          </p:stCondLst>
+                                        </p:cTn>
+                                        <p:tgtEl>
+                                          <p:spTgt spid="4">
+                                            <p:txEl>
+                                              <p:pRg st="7" end="7"/>
+                                            </p:txEl>
+                                          </p:spTgt>
+                                        </p:tgtEl>
+                                        <p:attrNameLst>
+                                          <p:attrName>style.visibility</p:attrName>
+                                        </p:attrNameLst>
+                                      </p:cBhvr>
+                                      <p:to>
+                                        <p:strVal val="visible"/>
+                                      </p:to>
+                                    </p:set>
+                                    <p:animEffect transition="in" filter="fade">
+                                      <p:cBhvr>
+                                        <p:cTn id="34" dur="500"/>
+                                        <p:tgtEl>
+                                          <p:spTgt spid="4">
+                                            <p:txEl>
+                                              <p:pRg st="7" end="7"/>
+                                            </p:txEl>
+                                          </p:spTgt>
+                                        </p:tgtEl>
+                                      </p:cBhvr>
+                                    </p:animEffect>
+                                  </p:childTnLst>
+                                </p:cTn>
+                              </p:par>
+                            </p:childTnLst>
+                          </p:cTn>
+                        </p:par>
+                      </p:childTnLst>
+                    </p:cTn>
+                  </p:par>
+                  <p:par>
+                    <p:cTn id="35" fill="hold">
+                      <p:stCondLst>
+                        <p:cond delay="indefinite"/>
+                      </p:stCondLst>
+                      <p:childTnLst>
+                        <p:par>
+                          <p:cTn id="36" fill="hold">
+                            <p:stCondLst>
+                              <p:cond delay="0"/>
+                            </p:stCondLst>
+                            <p:childTnLst>
+                              <p:par>
+                                <p:cTn id="37" presetID="10" presetClass="entr" presetSubtype="0" fill="hold" grpId="0" nodeType="clickEffect">
+                                  <p:stCondLst>
+                                    <p:cond delay="0"/>
+                                  </p:stCondLst>
+                                  <p:childTnLst>
+                                    <p:set>
+                                      <p:cBhvr>
+                                        <p:cTn id="38" dur="1" fill="hold">
+                                          <p:stCondLst>
+                                            <p:cond delay="0"/>
+                                          </p:stCondLst>
+                                        </p:cTn>
+                                        <p:tgtEl>
+                                          <p:spTgt spid="4">
+                                            <p:txEl>
+                                              <p:pRg st="8" end="8"/>
+                                            </p:txEl>
+                                          </p:spTgt>
+                                        </p:tgtEl>
+                                        <p:attrNameLst>
+                                          <p:attrName>style.visibility</p:attrName>
+                                        </p:attrNameLst>
+                                      </p:cBhvr>
+                                      <p:to>
+                                        <p:strVal val="visible"/>
+                                      </p:to>
+                                    </p:set>
+                                    <p:animEffect transition="in" filter="fade">
+                                      <p:cBhvr>
+                                        <p:cTn id="39" dur="500"/>
+                                        <p:tgtEl>
+                                          <p:spTgt spid="4">
+                                            <p:txEl>
+                                              <p:pRg st="8" end="8"/>
+                                            </p:txEl>
+                                          </p:spTgt>
+                                        </p:tgtEl>
+                                      </p:cBhvr>
+                                    </p:animEffect>
+                                  </p:childTnLst>
+                                </p:cTn>
+                              </p:par>
+                              <p:par>
+                                <p:cTn id="40" presetID="10" presetClass="entr" presetSubtype="0" fill="hold" grpId="0" nodeType="withEffect">
+                                  <p:stCondLst>
+                                    <p:cond delay="0"/>
+                                  </p:stCondLst>
+                                  <p:childTnLst>
+                                    <p:set>
+                                      <p:cBhvr>
+                                        <p:cTn id="41" dur="1" fill="hold">
+                                          <p:stCondLst>
+                                            <p:cond delay="0"/>
+                                          </p:stCondLst>
+                                        </p:cTn>
+                                        <p:tgtEl>
+                                          <p:spTgt spid="4">
+                                            <p:txEl>
+                                              <p:pRg st="9" end="9"/>
+                                            </p:txEl>
+                                          </p:spTgt>
+                                        </p:tgtEl>
+                                        <p:attrNameLst>
+                                          <p:attrName>style.visibility</p:attrName>
+                                        </p:attrNameLst>
+                                      </p:cBhvr>
+                                      <p:to>
+                                        <p:strVal val="visible"/>
+                                      </p:to>
+                                    </p:set>
+                                    <p:animEffect transition="in" filter="fade">
+                                      <p:cBhvr>
+                                        <p:cTn id="42" dur="500"/>
+                                        <p:tgtEl>
+                                          <p:spTgt spid="4">
+                                            <p:txEl>
+                                              <p:pRg st="9" end="9"/>
+                                            </p:txEl>
+                                          </p:spTgt>
+                                        </p:tgtEl>
+                                      </p:cBhvr>
+                                    </p:animEffect>
+                                  </p:childTnLst>
+                                </p:cTn>
+                              </p:par>
+                            </p:childTnLst>
+                          </p:cTn>
+                        </p:par>
+                      </p:childTnLst>
+                    </p:cTn>
+                  </p:par>
+                  <p:par>
+                    <p:cTn id="43" fill="hold">
+                      <p:stCondLst>
+                        <p:cond delay="indefinite"/>
+                      </p:stCondLst>
+                      <p:childTnLst>
+                        <p:par>
+                          <p:cTn id="44" fill="hold">
+                            <p:stCondLst>
+                              <p:cond delay="0"/>
+                            </p:stCondLst>
+                            <p:childTnLst>
+                              <p:par>
+                                <p:cTn id="45" presetID="10" presetClass="entr" presetSubtype="0" fill="hold" grpId="0" nodeType="clickEffect">
+                                  <p:stCondLst>
+                                    <p:cond delay="0"/>
+                                  </p:stCondLst>
+                                  <p:childTnLst>
+                                    <p:set>
+                                      <p:cBhvr>
+                                        <p:cTn id="46" dur="1" fill="hold">
+                                          <p:stCondLst>
+                                            <p:cond delay="0"/>
+                                          </p:stCondLst>
+                                        </p:cTn>
+                                        <p:tgtEl>
+                                          <p:spTgt spid="4">
+                                            <p:txEl>
+                                              <p:pRg st="10" end="10"/>
+                                            </p:txEl>
+                                          </p:spTgt>
+                                        </p:tgtEl>
+                                        <p:attrNameLst>
+                                          <p:attrName>style.visibility</p:attrName>
+                                        </p:attrNameLst>
+                                      </p:cBhvr>
+                                      <p:to>
+                                        <p:strVal val="visible"/>
+                                      </p:to>
+                                    </p:set>
+                                    <p:animEffect transition="in" filter="fade">
+                                      <p:cBhvr>
+                                        <p:cTn id="47" dur="500"/>
+                                        <p:tgtEl>
+                                          <p:spTgt spid="4">
+                                            <p:txEl>
+                                              <p:pRg st="10" end="10"/>
+                                            </p:txEl>
+                                          </p:spTgt>
+                                        </p:tgtEl>
+                                      </p:cBhvr>
+                                    </p:animEffect>
+                                  </p:childTnLst>
+                                </p:cTn>
+                              </p:par>
+                              <p:par>
+                                <p:cTn id="48" presetID="10" presetClass="entr" presetSubtype="0" fill="hold" grpId="0" nodeType="withEffect">
+                                  <p:stCondLst>
+                                    <p:cond delay="0"/>
+                                  </p:stCondLst>
+                                  <p:childTnLst>
+                                    <p:set>
+                                      <p:cBhvr>
+                                        <p:cTn id="49" dur="1" fill="hold">
+                                          <p:stCondLst>
+                                            <p:cond delay="0"/>
+                                          </p:stCondLst>
+                                        </p:cTn>
+                                        <p:tgtEl>
+                                          <p:spTgt spid="4">
+                                            <p:txEl>
+                                              <p:pRg st="11" end="11"/>
+                                            </p:txEl>
+                                          </p:spTgt>
+                                        </p:tgtEl>
+                                        <p:attrNameLst>
+                                          <p:attrName>style.visibility</p:attrName>
+                                        </p:attrNameLst>
+                                      </p:cBhvr>
+                                      <p:to>
+                                        <p:strVal val="visible"/>
+                                      </p:to>
+                                    </p:set>
+                                    <p:animEffect transition="in" filter="fade">
+                                      <p:cBhvr>
+                                        <p:cTn id="50" dur="500"/>
+                                        <p:tgtEl>
+                                          <p:spTgt spid="4">
+                                            <p:txEl>
+                                              <p:pRg st="11" end="11"/>
+                                            </p:txEl>
+                                          </p:spTgt>
+                                        </p:tgtEl>
+                                      </p:cBhvr>
+                                    </p:animEffect>
+                                  </p:childTnLst>
+                                </p:cTn>
+                              </p:par>
+                            </p:childTnLst>
+                          </p:cTn>
+                        </p:par>
+                      </p:childTnLst>
+                    </p:cTn>
+                  </p:par>
+                </p:childTnLst>
+              </p:cTn>
+              <p:prevCondLst>
+                <p:cond evt="onPrev" delay="0">
+                  <p:tgtEl>
+                    <p:sldTgt/>
+                  </p:tgtEl>
+                </p:cond>
+              </p:prevCondLst>
+              <p:nextCondLst>
+                <p:cond evt="onNext" delay="0">
+                  <p:tgtEl>
+                    <p:sldTgt/>
+                  </p:tgtEl>
+                </p:cond>
+              </p:nextCondLst>
+            </p:seq>
+          </p:childTnLst>
+        </p:cTn>
+      </p:par>
+    </p:tnLst>
+    <p:bldLst>
+      <p:bldP spid="4" grpId="0" build="p"/>
+    </p:bldLst>
+  </p:timing>
 </p:sld>
 </file>
 

</xml_diff>

<commit_message>
Added glow to sets in training (and removed redundant files)
</commit_message>
<xml_diff>
--- a/Documentation/Training/CohortBuilder.pptx
+++ b/Documentation/Training/CohortBuilder.pptx
@@ -251,7 +251,7 @@
           <a:p>
             <a:fld id="{E6799723-5C7A-4148-A580-1582FB869D21}" type="datetimeFigureOut">
               <a:rPr lang="en-GB" smtClean="0"/>
-              <a:t>29/11/2019</a:t>
+              <a:t>26/02/2020</a:t>
             </a:fld>
             <a:endParaRPr lang="en-GB"/>
           </a:p>
@@ -995,7 +995,7 @@
           <a:p>
             <a:fld id="{A4B2E03E-B9F4-48CD-BEDC-03BA93144C1F}" type="datetimeFigureOut">
               <a:rPr lang="en-GB" smtClean="0"/>
-              <a:t>29/11/2019</a:t>
+              <a:t>26/02/2020</a:t>
             </a:fld>
             <a:endParaRPr lang="en-GB"/>
           </a:p>
@@ -1165,7 +1165,7 @@
           <a:p>
             <a:fld id="{A4B2E03E-B9F4-48CD-BEDC-03BA93144C1F}" type="datetimeFigureOut">
               <a:rPr lang="en-GB" smtClean="0"/>
-              <a:t>29/11/2019</a:t>
+              <a:t>26/02/2020</a:t>
             </a:fld>
             <a:endParaRPr lang="en-GB"/>
           </a:p>
@@ -1345,7 +1345,7 @@
           <a:p>
             <a:fld id="{A4B2E03E-B9F4-48CD-BEDC-03BA93144C1F}" type="datetimeFigureOut">
               <a:rPr lang="en-GB" smtClean="0"/>
-              <a:t>29/11/2019</a:t>
+              <a:t>26/02/2020</a:t>
             </a:fld>
             <a:endParaRPr lang="en-GB"/>
           </a:p>
@@ -1515,7 +1515,7 @@
           <a:p>
             <a:fld id="{A4B2E03E-B9F4-48CD-BEDC-03BA93144C1F}" type="datetimeFigureOut">
               <a:rPr lang="en-GB" smtClean="0"/>
-              <a:t>29/11/2019</a:t>
+              <a:t>26/02/2020</a:t>
             </a:fld>
             <a:endParaRPr lang="en-GB"/>
           </a:p>
@@ -1761,7 +1761,7 @@
           <a:p>
             <a:fld id="{A4B2E03E-B9F4-48CD-BEDC-03BA93144C1F}" type="datetimeFigureOut">
               <a:rPr lang="en-GB" smtClean="0"/>
-              <a:t>29/11/2019</a:t>
+              <a:t>26/02/2020</a:t>
             </a:fld>
             <a:endParaRPr lang="en-GB"/>
           </a:p>
@@ -1993,7 +1993,7 @@
           <a:p>
             <a:fld id="{A4B2E03E-B9F4-48CD-BEDC-03BA93144C1F}" type="datetimeFigureOut">
               <a:rPr lang="en-GB" smtClean="0"/>
-              <a:t>29/11/2019</a:t>
+              <a:t>26/02/2020</a:t>
             </a:fld>
             <a:endParaRPr lang="en-GB"/>
           </a:p>
@@ -2360,7 +2360,7 @@
           <a:p>
             <a:fld id="{A4B2E03E-B9F4-48CD-BEDC-03BA93144C1F}" type="datetimeFigureOut">
               <a:rPr lang="en-GB" smtClean="0"/>
-              <a:t>29/11/2019</a:t>
+              <a:t>26/02/2020</a:t>
             </a:fld>
             <a:endParaRPr lang="en-GB"/>
           </a:p>
@@ -2478,7 +2478,7 @@
           <a:p>
             <a:fld id="{A4B2E03E-B9F4-48CD-BEDC-03BA93144C1F}" type="datetimeFigureOut">
               <a:rPr lang="en-GB" smtClean="0"/>
-              <a:t>29/11/2019</a:t>
+              <a:t>26/02/2020</a:t>
             </a:fld>
             <a:endParaRPr lang="en-GB"/>
           </a:p>
@@ -2573,7 +2573,7 @@
           <a:p>
             <a:fld id="{A4B2E03E-B9F4-48CD-BEDC-03BA93144C1F}" type="datetimeFigureOut">
               <a:rPr lang="en-GB" smtClean="0"/>
-              <a:t>29/11/2019</a:t>
+              <a:t>26/02/2020</a:t>
             </a:fld>
             <a:endParaRPr lang="en-GB"/>
           </a:p>
@@ -2850,7 +2850,7 @@
           <a:p>
             <a:fld id="{A4B2E03E-B9F4-48CD-BEDC-03BA93144C1F}" type="datetimeFigureOut">
               <a:rPr lang="en-GB" smtClean="0"/>
-              <a:t>29/11/2019</a:t>
+              <a:t>26/02/2020</a:t>
             </a:fld>
             <a:endParaRPr lang="en-GB"/>
           </a:p>
@@ -3103,7 +3103,7 @@
           <a:p>
             <a:fld id="{A4B2E03E-B9F4-48CD-BEDC-03BA93144C1F}" type="datetimeFigureOut">
               <a:rPr lang="en-GB" smtClean="0"/>
-              <a:t>29/11/2019</a:t>
+              <a:t>26/02/2020</a:t>
             </a:fld>
             <a:endParaRPr lang="en-GB"/>
           </a:p>
@@ -3316,7 +3316,7 @@
           <a:p>
             <a:fld id="{A4B2E03E-B9F4-48CD-BEDC-03BA93144C1F}" type="datetimeFigureOut">
               <a:rPr lang="en-GB" smtClean="0"/>
-              <a:t>29/11/2019</a:t>
+              <a:t>26/02/2020</a:t>
             </a:fld>
             <a:endParaRPr lang="en-GB"/>
           </a:p>
@@ -4803,10 +4803,10 @@
       </p:grpSp>
       <p:grpSp>
         <p:nvGrpSpPr>
-          <p:cNvPr id="38" name="Group 37">
+          <p:cNvPr id="4" name="Group 3">
             <a:extLst>
               <a:ext uri="{FF2B5EF4-FFF2-40B4-BE49-F238E27FC236}">
-                <a16:creationId xmlns:a16="http://schemas.microsoft.com/office/drawing/2014/main" id="{9F558821-AEA2-4CCF-A681-60F9E872982A}"/>
+                <a16:creationId xmlns:a16="http://schemas.microsoft.com/office/drawing/2014/main" id="{6A7A2196-934B-46A9-A1A1-A162ED15D36A}"/>
               </a:ext>
             </a:extLst>
           </p:cNvPr>
@@ -4960,7 +4960,7 @@
             <a:lstStyle/>
             <a:p>
               <a:pPr algn="ctr"/>
-              <a:endParaRPr lang="en-GB"/>
+              <a:endParaRPr lang="en-GB" u="sng"/>
             </a:p>
           </p:txBody>
         </p:sp>
@@ -5123,7 +5123,7 @@
             <a:lstStyle/>
             <a:p>
               <a:pPr algn="ctr"/>
-              <a:endParaRPr lang="en-GB"/>
+              <a:endParaRPr lang="en-GB" u="sng"/>
             </a:p>
           </p:txBody>
         </p:sp>
@@ -5266,6 +5266,14 @@
                 <a:srgbClr val="00B050"/>
               </a:solidFill>
             </a:ln>
+            <a:effectLst>
+              <a:glow rad="228600">
+                <a:schemeClr val="accent6">
+                  <a:satMod val="175000"/>
+                  <a:alpha val="40000"/>
+                </a:schemeClr>
+              </a:glow>
+            </a:effectLst>
           </p:spPr>
           <p:style>
             <a:lnRef idx="2">
@@ -5288,7 +5296,7 @@
             <a:lstStyle/>
             <a:p>
               <a:pPr algn="ctr"/>
-              <a:endParaRPr lang="en-GB"/>
+              <a:endParaRPr lang="en-GB" u="sng"/>
             </a:p>
           </p:txBody>
         </p:sp>
@@ -5321,16 +5329,16 @@
             <a:lstStyle/>
             <a:p>
               <a:r>
-                <a:rPr lang="en-US" sz="1200" dirty="0"/>
+                <a:rPr lang="en-US" sz="1200" u="sng" dirty="0"/>
                 <a:t>Set 1 EXCEPT Set 2</a:t>
               </a:r>
             </a:p>
             <a:p>
               <a:r>
-                <a:rPr lang="en-US" sz="1200" dirty="0"/>
+                <a:rPr lang="en-US" sz="1200" u="sng" dirty="0"/>
                 <a:t>People who have ever had Diazepam prescriptions only after 2000</a:t>
               </a:r>
-              <a:endParaRPr lang="en-GB" sz="1200" dirty="0"/>
+              <a:endParaRPr lang="en-GB" sz="1200" u="sng" dirty="0"/>
             </a:p>
           </p:txBody>
         </p:sp>
@@ -6583,6 +6591,14 @@
                 <a:srgbClr val="00B050"/>
               </a:solidFill>
             </a:ln>
+            <a:effectLst>
+              <a:glow rad="228600">
+                <a:schemeClr val="accent6">
+                  <a:satMod val="175000"/>
+                  <a:alpha val="40000"/>
+                </a:schemeClr>
+              </a:glow>
+            </a:effectLst>
           </p:spPr>
           <p:style>
             <a:lnRef idx="2">
@@ -6815,7 +6831,7 @@
                                           </p:stCondLst>
                                         </p:cTn>
                                         <p:tgtEl>
-                                          <p:spTgt spid="38"/>
+                                          <p:spTgt spid="63"/>
                                         </p:tgtEl>
                                         <p:attrNameLst>
                                           <p:attrName>style.visibility</p:attrName>
@@ -6828,59 +6844,6 @@
                                     <p:animEffect transition="in" filter="fade">
                                       <p:cBhvr>
                                         <p:cTn id="22" dur="500"/>
-                                        <p:tgtEl>
-                                          <p:spTgt spid="38"/>
-                                        </p:tgtEl>
-                                      </p:cBhvr>
-                                    </p:animEffect>
-                                  </p:childTnLst>
-                                </p:cTn>
-                              </p:par>
-                            </p:childTnLst>
-                          </p:cTn>
-                        </p:par>
-                      </p:childTnLst>
-                    </p:cTn>
-                  </p:par>
-                  <p:par>
-                    <p:cTn id="23" fill="hold">
-                      <p:stCondLst>
-                        <p:cond delay="indefinite"/>
-                      </p:stCondLst>
-                      <p:childTnLst>
-                        <p:par>
-                          <p:cTn id="24" fill="hold">
-                            <p:stCondLst>
-                              <p:cond delay="0"/>
-                            </p:stCondLst>
-                            <p:childTnLst>
-                              <p:par>
-                                <p:cTn id="25" presetID="10" presetClass="entr" presetSubtype="0" fill="hold" nodeType="clickEffect">
-                                  <p:stCondLst>
-                                    <p:cond delay="0"/>
-                                  </p:stCondLst>
-                                  <p:childTnLst>
-                                    <p:set>
-                                      <p:cBhvr>
-                                        <p:cTn id="26" dur="1" fill="hold">
-                                          <p:stCondLst>
-                                            <p:cond delay="0"/>
-                                          </p:stCondLst>
-                                        </p:cTn>
-                                        <p:tgtEl>
-                                          <p:spTgt spid="63"/>
-                                        </p:tgtEl>
-                                        <p:attrNameLst>
-                                          <p:attrName>style.visibility</p:attrName>
-                                        </p:attrNameLst>
-                                      </p:cBhvr>
-                                      <p:to>
-                                        <p:strVal val="visible"/>
-                                      </p:to>
-                                    </p:set>
-                                    <p:animEffect transition="in" filter="fade">
-                                      <p:cBhvr>
-                                        <p:cTn id="27" dur="500"/>
                                         <p:tgtEl>
                                           <p:spTgt spid="63"/>
                                         </p:tgtEl>
@@ -8312,6 +8275,14 @@
                 <a:srgbClr val="00B050"/>
               </a:solidFill>
             </a:ln>
+            <a:effectLst>
+              <a:glow rad="228600">
+                <a:schemeClr val="accent6">
+                  <a:satMod val="175000"/>
+                  <a:alpha val="40000"/>
+                </a:schemeClr>
+              </a:glow>
+            </a:effectLst>
           </p:spPr>
           <p:style>
             <a:lnRef idx="2">
@@ -8393,8 +8364,8 @@
           </a:p>
         </p:txBody>
       </p:sp>
-      <mc:AlternateContent xmlns:mc="http://schemas.openxmlformats.org/markup-compatibility/2006">
-        <mc:Choice xmlns:a14="http://schemas.microsoft.com/office/drawing/2010/main" Requires="a14">
+      <mc:AlternateContent xmlns:mc="http://schemas.openxmlformats.org/markup-compatibility/2006" xmlns:a14="http://schemas.microsoft.com/office/drawing/2010/main">
+        <mc:Choice Requires="a14">
           <p:sp>
             <p:nvSpPr>
               <p:cNvPr id="14" name="TextBox 13">
@@ -8450,7 +8421,7 @@
             </p:txBody>
           </p:sp>
         </mc:Choice>
-        <mc:Fallback>
+        <mc:Fallback xmlns="">
           <p:sp>
             <p:nvSpPr>
               <p:cNvPr id="14" name="TextBox 13">
@@ -9820,6 +9791,14 @@
                 <a:srgbClr val="00B050"/>
               </a:solidFill>
             </a:ln>
+            <a:effectLst>
+              <a:glow rad="228600">
+                <a:schemeClr val="accent6">
+                  <a:satMod val="175000"/>
+                  <a:alpha val="40000"/>
+                </a:schemeClr>
+              </a:glow>
+            </a:effectLst>
           </p:spPr>
           <p:style>
             <a:lnRef idx="2">
@@ -9849,8 +9828,8 @@
           </p:txBody>
         </p:sp>
       </p:grpSp>
-      <mc:AlternateContent xmlns:mc="http://schemas.openxmlformats.org/markup-compatibility/2006">
-        <mc:Choice xmlns:a14="http://schemas.microsoft.com/office/drawing/2010/main" Requires="a14">
+      <mc:AlternateContent xmlns:mc="http://schemas.openxmlformats.org/markup-compatibility/2006" xmlns:a14="http://schemas.microsoft.com/office/drawing/2010/main">
+        <mc:Choice Requires="a14">
           <p:sp>
             <p:nvSpPr>
               <p:cNvPr id="14" name="TextBox 13">
@@ -9906,7 +9885,7 @@
             </p:txBody>
           </p:sp>
         </mc:Choice>
-        <mc:Fallback>
+        <mc:Fallback xmlns="">
           <p:sp>
             <p:nvSpPr>
               <p:cNvPr id="14" name="TextBox 13">
@@ -21135,7 +21114,7 @@
           <a:p>
             <a:pPr algn="ctr"/>
             <a:r>
-              <a:rPr lang="en-GB" dirty="0"/>
+              <a:rPr lang="en-GB"/>
               <a:t>Set 1</a:t>
             </a:r>
           </a:p>
@@ -21903,10 +21882,10 @@
       </p:sp>
       <p:grpSp>
         <p:nvGrpSpPr>
-          <p:cNvPr id="7" name="Group 6">
+          <p:cNvPr id="5" name="Group 4">
             <a:extLst>
               <a:ext uri="{FF2B5EF4-FFF2-40B4-BE49-F238E27FC236}">
-                <a16:creationId xmlns:a16="http://schemas.microsoft.com/office/drawing/2014/main" id="{0758D805-286E-4FAB-83D4-1130ED8A32C4}"/>
+                <a16:creationId xmlns:a16="http://schemas.microsoft.com/office/drawing/2014/main" id="{8FB8CAEC-520D-4441-ACDA-3B3FCB6DFE34}"/>
               </a:ext>
             </a:extLst>
           </p:cNvPr>
@@ -21917,8 +21896,8 @@
           <a:xfrm>
             <a:off x="838200" y="1829466"/>
             <a:ext cx="4115368" cy="2952444"/>
-            <a:chOff x="5817890" y="656197"/>
-            <a:chExt cx="2614427" cy="1875640"/>
+            <a:chOff x="838200" y="1829466"/>
+            <a:chExt cx="4115368" cy="2952444"/>
           </a:xfrm>
         </p:grpSpPr>
         <p:sp>
@@ -21935,8 +21914,8 @@
           </p:nvSpPr>
           <p:spPr>
             <a:xfrm>
-              <a:off x="6913867" y="1013387"/>
-              <a:ext cx="1518450" cy="1518450"/>
+              <a:off x="2563377" y="2391719"/>
+              <a:ext cx="2390191" cy="2390191"/>
             </a:xfrm>
             <a:prstGeom prst="ellipse">
               <a:avLst/>
@@ -21996,8 +21975,8 @@
           </p:nvSpPr>
           <p:spPr>
             <a:xfrm>
-              <a:off x="5817890" y="656197"/>
-              <a:ext cx="1518450" cy="1518450"/>
+              <a:off x="838200" y="1829466"/>
+              <a:ext cx="2390191" cy="2390191"/>
             </a:xfrm>
             <a:prstGeom prst="ellipse">
               <a:avLst/>
@@ -22052,8 +22031,8 @@
               </p:nvSpPr>
               <p:spPr>
                 <a:xfrm>
-                  <a:off x="5817890" y="656197"/>
-                  <a:ext cx="2614427" cy="1875640"/>
+                  <a:off x="838200" y="1829466"/>
+                  <a:ext cx="4115368" cy="2952444"/>
                 </a:xfrm>
                 <a:custGeom>
                   <a:avLst/>
@@ -22195,6 +22174,14 @@
                     <a:srgbClr val="00B050"/>
                   </a:solidFill>
                 </a:ln>
+                <a:effectLst>
+                  <a:glow rad="228600">
+                    <a:schemeClr val="accent6">
+                      <a:satMod val="175000"/>
+                      <a:alpha val="40000"/>
+                    </a:schemeClr>
+                  </a:glow>
+                </a:effectLst>
               </p:spPr>
               <p:style>
                 <a:lnRef idx="2">
@@ -22269,8 +22256,8 @@
               </p:nvSpPr>
               <p:spPr>
                 <a:xfrm>
-                  <a:off x="5817890" y="656197"/>
-                  <a:ext cx="2614427" cy="1875640"/>
+                  <a:off x="838200" y="1829466"/>
+                  <a:ext cx="4115368" cy="2952444"/>
                 </a:xfrm>
                 <a:custGeom>
                   <a:avLst/>
@@ -22417,6 +22404,14 @@
                     <a:srgbClr val="00B050"/>
                   </a:solidFill>
                 </a:ln>
+                <a:effectLst>
+                  <a:glow rad="228600">
+                    <a:schemeClr val="accent6">
+                      <a:satMod val="175000"/>
+                      <a:alpha val="40000"/>
+                    </a:schemeClr>
+                  </a:glow>
+                </a:effectLst>
               </p:spPr>
               <p:txBody>
                 <a:bodyPr/>
@@ -22436,10 +22431,10 @@
       </p:grpSp>
       <p:grpSp>
         <p:nvGrpSpPr>
-          <p:cNvPr id="8" name="Group 7">
+          <p:cNvPr id="4" name="Group 3">
             <a:extLst>
               <a:ext uri="{FF2B5EF4-FFF2-40B4-BE49-F238E27FC236}">
-                <a16:creationId xmlns:a16="http://schemas.microsoft.com/office/drawing/2014/main" id="{732616BF-8665-4D79-B8D8-94BE64DD200D}"/>
+                <a16:creationId xmlns:a16="http://schemas.microsoft.com/office/drawing/2014/main" id="{713A71C9-360E-4444-9B62-B327B231E090}"/>
               </a:ext>
             </a:extLst>
           </p:cNvPr>
@@ -22450,8 +22445,8 @@
           <a:xfrm>
             <a:off x="5963135" y="359343"/>
             <a:ext cx="3921703" cy="2727516"/>
-            <a:chOff x="6289054" y="2985698"/>
-            <a:chExt cx="4735918" cy="3293797"/>
+            <a:chOff x="5963135" y="359343"/>
+            <a:chExt cx="3921703" cy="2727516"/>
           </a:xfrm>
         </p:grpSpPr>
         <p:sp>
@@ -22468,8 +22463,8 @@
           </p:nvSpPr>
           <p:spPr>
             <a:xfrm>
-              <a:off x="6289054" y="2985698"/>
-              <a:ext cx="2536303" cy="2996132"/>
+              <a:off x="5963135" y="359343"/>
+              <a:ext cx="2100253" cy="2481027"/>
             </a:xfrm>
             <a:custGeom>
               <a:avLst/>
@@ -22628,8 +22623,8 @@
           </p:nvSpPr>
           <p:spPr>
             <a:xfrm>
-              <a:off x="8432315" y="3242595"/>
-              <a:ext cx="2592657" cy="3036900"/>
+              <a:off x="7737919" y="572073"/>
+              <a:ext cx="2146919" cy="2514786"/>
             </a:xfrm>
             <a:custGeom>
               <a:avLst/>
@@ -22799,8 +22794,8 @@
               </p:nvSpPr>
               <p:spPr>
                 <a:xfrm>
-                  <a:off x="7988071" y="3405334"/>
-                  <a:ext cx="1297114" cy="2428866"/>
+                  <a:off x="7370051" y="706834"/>
+                  <a:ext cx="1074110" cy="2011287"/>
                 </a:xfrm>
                 <a:custGeom>
                   <a:avLst/>
@@ -22907,6 +22902,14 @@
                     <a:srgbClr val="00B050"/>
                   </a:solidFill>
                 </a:ln>
+                <a:effectLst>
+                  <a:glow rad="228600">
+                    <a:schemeClr val="accent6">
+                      <a:satMod val="175000"/>
+                      <a:alpha val="40000"/>
+                    </a:schemeClr>
+                  </a:glow>
+                </a:effectLst>
               </p:spPr>
               <p:style>
                 <a:lnRef idx="2">
@@ -22982,8 +22985,8 @@
               </p:nvSpPr>
               <p:spPr>
                 <a:xfrm>
-                  <a:off x="7988071" y="3405334"/>
-                  <a:ext cx="1297114" cy="2428866"/>
+                  <a:off x="7370051" y="706834"/>
+                  <a:ext cx="1074110" cy="2011287"/>
                 </a:xfrm>
                 <a:custGeom>
                   <a:avLst/>
@@ -23090,6 +23093,14 @@
                     <a:srgbClr val="00B050"/>
                   </a:solidFill>
                 </a:ln>
+                <a:effectLst>
+                  <a:glow rad="228600">
+                    <a:schemeClr val="accent6">
+                      <a:satMod val="175000"/>
+                      <a:alpha val="40000"/>
+                    </a:schemeClr>
+                  </a:glow>
+                </a:effectLst>
               </p:spPr>
               <p:txBody>
                 <a:bodyPr/>
@@ -23109,10 +23120,10 @@
       </p:grpSp>
       <p:grpSp>
         <p:nvGrpSpPr>
-          <p:cNvPr id="23" name="Group 22">
+          <p:cNvPr id="3" name="Group 2">
             <a:extLst>
               <a:ext uri="{FF2B5EF4-FFF2-40B4-BE49-F238E27FC236}">
-                <a16:creationId xmlns:a16="http://schemas.microsoft.com/office/drawing/2014/main" id="{06958E5B-91B4-4E89-9A8C-AAF5D3E3EF17}"/>
+                <a16:creationId xmlns:a16="http://schemas.microsoft.com/office/drawing/2014/main" id="{8E6D8585-E3F4-461D-A144-9BC56AFEBE5E}"/>
               </a:ext>
             </a:extLst>
           </p:cNvPr>
@@ -23123,8 +23134,8 @@
           <a:xfrm>
             <a:off x="5901045" y="3866269"/>
             <a:ext cx="4012121" cy="2790401"/>
-            <a:chOff x="6289054" y="2985698"/>
-            <a:chExt cx="4735918" cy="3293797"/>
+            <a:chOff x="5901045" y="3866269"/>
+            <a:chExt cx="4012121" cy="2790401"/>
           </a:xfrm>
         </p:grpSpPr>
         <p:sp>
@@ -23141,8 +23152,8 @@
           </p:nvSpPr>
           <p:spPr>
             <a:xfrm>
-              <a:off x="8432315" y="3242595"/>
-              <a:ext cx="2592657" cy="3036900"/>
+              <a:off x="7716748" y="4083904"/>
+              <a:ext cx="2196418" cy="2572766"/>
             </a:xfrm>
             <a:custGeom>
               <a:avLst/>
@@ -23310,8 +23321,8 @@
           </p:nvSpPr>
           <p:spPr>
             <a:xfrm>
-              <a:off x="7988071" y="3405334"/>
-              <a:ext cx="1297114" cy="2428866"/>
+              <a:off x="7340399" y="4221771"/>
+              <a:ext cx="1098874" cy="2057659"/>
             </a:xfrm>
             <a:custGeom>
               <a:avLst/>
@@ -23459,8 +23470,8 @@
           </p:nvSpPr>
           <p:spPr>
             <a:xfrm>
-              <a:off x="6289054" y="2985698"/>
-              <a:ext cx="2536303" cy="2996132"/>
+              <a:off x="5901045" y="3866269"/>
+              <a:ext cx="2148676" cy="2538229"/>
             </a:xfrm>
             <a:custGeom>
               <a:avLst/>
@@ -23584,6 +23595,14 @@
                 <a:srgbClr val="00B050"/>
               </a:solidFill>
             </a:ln>
+            <a:effectLst>
+              <a:glow rad="228600">
+                <a:schemeClr val="accent6">
+                  <a:satMod val="175000"/>
+                  <a:alpha val="40000"/>
+                </a:schemeClr>
+              </a:glow>
+            </a:effectLst>
           </p:spPr>
           <p:style>
             <a:lnRef idx="2">
@@ -23629,195 +23648,6 @@
   <p:clrMapOvr>
     <a:masterClrMapping/>
   </p:clrMapOvr>
-  <p:timing>
-    <p:tnLst>
-      <p:par>
-        <p:cTn id="1" dur="indefinite" restart="never" nodeType="tmRoot">
-          <p:childTnLst>
-            <p:seq concurrent="1" nextAc="seek">
-              <p:cTn id="2" dur="indefinite" nodeType="mainSeq">
-                <p:childTnLst>
-                  <p:par>
-                    <p:cTn id="3" fill="hold">
-                      <p:stCondLst>
-                        <p:cond delay="indefinite"/>
-                      </p:stCondLst>
-                      <p:childTnLst>
-                        <p:par>
-                          <p:cTn id="4" fill="hold">
-                            <p:stCondLst>
-                              <p:cond delay="0"/>
-                            </p:stCondLst>
-                            <p:childTnLst>
-                              <p:par>
-                                <p:cTn id="5" presetID="10" presetClass="entr" presetSubtype="0" fill="hold" nodeType="clickEffect">
-                                  <p:stCondLst>
-                                    <p:cond delay="0"/>
-                                  </p:stCondLst>
-                                  <p:childTnLst>
-                                    <p:set>
-                                      <p:cBhvr>
-                                        <p:cTn id="6" dur="1" fill="hold">
-                                          <p:stCondLst>
-                                            <p:cond delay="0"/>
-                                          </p:stCondLst>
-                                        </p:cTn>
-                                        <p:tgtEl>
-                                          <p:spTgt spid="7"/>
-                                        </p:tgtEl>
-                                        <p:attrNameLst>
-                                          <p:attrName>style.visibility</p:attrName>
-                                        </p:attrNameLst>
-                                      </p:cBhvr>
-                                      <p:to>
-                                        <p:strVal val="visible"/>
-                                      </p:to>
-                                    </p:set>
-                                    <p:animEffect transition="in" filter="fade">
-                                      <p:cBhvr>
-                                        <p:cTn id="7" dur="500"/>
-                                        <p:tgtEl>
-                                          <p:spTgt spid="7"/>
-                                        </p:tgtEl>
-                                      </p:cBhvr>
-                                    </p:animEffect>
-                                  </p:childTnLst>
-                                </p:cTn>
-                              </p:par>
-                            </p:childTnLst>
-                          </p:cTn>
-                        </p:par>
-                      </p:childTnLst>
-                    </p:cTn>
-                  </p:par>
-                  <p:par>
-                    <p:cTn id="8" fill="hold">
-                      <p:stCondLst>
-                        <p:cond delay="indefinite"/>
-                      </p:stCondLst>
-                      <p:childTnLst>
-                        <p:par>
-                          <p:cTn id="9" fill="hold">
-                            <p:stCondLst>
-                              <p:cond delay="0"/>
-                            </p:stCondLst>
-                            <p:childTnLst>
-                              <p:par>
-                                <p:cTn id="10" presetID="10" presetClass="entr" presetSubtype="0" fill="hold" nodeType="clickEffect">
-                                  <p:stCondLst>
-                                    <p:cond delay="0"/>
-                                  </p:stCondLst>
-                                  <p:childTnLst>
-                                    <p:set>
-                                      <p:cBhvr>
-                                        <p:cTn id="11" dur="1" fill="hold">
-                                          <p:stCondLst>
-                                            <p:cond delay="0"/>
-                                          </p:stCondLst>
-                                        </p:cTn>
-                                        <p:tgtEl>
-                                          <p:spTgt spid="8"/>
-                                        </p:tgtEl>
-                                        <p:attrNameLst>
-                                          <p:attrName>style.visibility</p:attrName>
-                                        </p:attrNameLst>
-                                      </p:cBhvr>
-                                      <p:to>
-                                        <p:strVal val="visible"/>
-                                      </p:to>
-                                    </p:set>
-                                    <p:animEffect transition="in" filter="fade">
-                                      <p:cBhvr>
-                                        <p:cTn id="12" dur="500"/>
-                                        <p:tgtEl>
-                                          <p:spTgt spid="8"/>
-                                        </p:tgtEl>
-                                      </p:cBhvr>
-                                    </p:animEffect>
-                                  </p:childTnLst>
-                                </p:cTn>
-                              </p:par>
-                            </p:childTnLst>
-                          </p:cTn>
-                        </p:par>
-                      </p:childTnLst>
-                    </p:cTn>
-                  </p:par>
-                  <p:par>
-                    <p:cTn id="13" fill="hold">
-                      <p:stCondLst>
-                        <p:cond delay="indefinite"/>
-                      </p:stCondLst>
-                      <p:childTnLst>
-                        <p:par>
-                          <p:cTn id="14" fill="hold">
-                            <p:stCondLst>
-                              <p:cond delay="0"/>
-                            </p:stCondLst>
-                            <p:childTnLst>
-                              <p:par>
-                                <p:cTn id="15" presetID="10" presetClass="entr" presetSubtype="0" fill="hold" nodeType="clickEffect">
-                                  <p:stCondLst>
-                                    <p:cond delay="0"/>
-                                  </p:stCondLst>
-                                  <p:childTnLst>
-                                    <p:set>
-                                      <p:cBhvr>
-                                        <p:cTn id="16" dur="1" fill="hold">
-                                          <p:stCondLst>
-                                            <p:cond delay="0"/>
-                                          </p:stCondLst>
-                                        </p:cTn>
-                                        <p:tgtEl>
-                                          <p:spTgt spid="23"/>
-                                        </p:tgtEl>
-                                        <p:attrNameLst>
-                                          <p:attrName>style.visibility</p:attrName>
-                                        </p:attrNameLst>
-                                      </p:cBhvr>
-                                      <p:to>
-                                        <p:strVal val="visible"/>
-                                      </p:to>
-                                    </p:set>
-                                    <p:animEffect transition="in" filter="fade">
-                                      <p:cBhvr>
-                                        <p:cTn id="17" dur="500"/>
-                                        <p:tgtEl>
-                                          <p:spTgt spid="23"/>
-                                        </p:tgtEl>
-                                      </p:cBhvr>
-                                    </p:animEffect>
-                                  </p:childTnLst>
-                                </p:cTn>
-                              </p:par>
-                            </p:childTnLst>
-                          </p:cTn>
-                        </p:par>
-                      </p:childTnLst>
-                    </p:cTn>
-                  </p:par>
-                </p:childTnLst>
-              </p:cTn>
-              <p:prevCondLst>
-                <p:cond evt="onPrev" delay="0">
-                  <p:tgtEl>
-                    <p:sldTgt/>
-                  </p:tgtEl>
-                </p:cond>
-              </p:prevCondLst>
-              <p:nextCondLst>
-                <p:cond evt="onNext" delay="0">
-                  <p:tgtEl>
-                    <p:sldTgt/>
-                  </p:tgtEl>
-                </p:cond>
-              </p:nextCondLst>
-            </p:seq>
-          </p:childTnLst>
-        </p:cTn>
-      </p:par>
-    </p:tnLst>
-  </p:timing>
 </p:sld>
 </file>
 
@@ -23871,8 +23701,8 @@
           </a:p>
         </p:txBody>
       </p:sp>
-      <mc:AlternateContent xmlns:mc="http://schemas.openxmlformats.org/markup-compatibility/2006">
-        <mc:Choice xmlns:a14="http://schemas.microsoft.com/office/drawing/2010/main" Requires="a14">
+      <mc:AlternateContent xmlns:mc="http://schemas.openxmlformats.org/markup-compatibility/2006" xmlns:a14="http://schemas.microsoft.com/office/drawing/2010/main">
+        <mc:Choice Requires="a14">
           <p:sp>
             <p:nvSpPr>
               <p:cNvPr id="25" name="Content Placeholder 24">
@@ -24338,7 +24168,7 @@
             </p:txBody>
           </p:sp>
         </mc:Choice>
-        <mc:Fallback>
+        <mc:Fallback xmlns="">
           <p:sp>
             <p:nvSpPr>
               <p:cNvPr id="25" name="Content Placeholder 24">

</xml_diff>

<commit_message>
Updated to match new cohort builder UI and homescreen
</commit_message>
<xml_diff>
--- a/Documentation/Training/CohortBuilder.pptx
+++ b/Documentation/Training/CohortBuilder.pptx
@@ -251,7 +251,7 @@
           <a:p>
             <a:fld id="{E6799723-5C7A-4148-A580-1582FB869D21}" type="datetimeFigureOut">
               <a:rPr lang="en-GB" smtClean="0"/>
-              <a:t>26/02/2020</a:t>
+              <a:t>19/05/2020</a:t>
             </a:fld>
             <a:endParaRPr lang="en-GB"/>
           </a:p>
@@ -995,7 +995,7 @@
           <a:p>
             <a:fld id="{A4B2E03E-B9F4-48CD-BEDC-03BA93144C1F}" type="datetimeFigureOut">
               <a:rPr lang="en-GB" smtClean="0"/>
-              <a:t>26/02/2020</a:t>
+              <a:t>19/05/2020</a:t>
             </a:fld>
             <a:endParaRPr lang="en-GB"/>
           </a:p>
@@ -1165,7 +1165,7 @@
           <a:p>
             <a:fld id="{A4B2E03E-B9F4-48CD-BEDC-03BA93144C1F}" type="datetimeFigureOut">
               <a:rPr lang="en-GB" smtClean="0"/>
-              <a:t>26/02/2020</a:t>
+              <a:t>19/05/2020</a:t>
             </a:fld>
             <a:endParaRPr lang="en-GB"/>
           </a:p>
@@ -1345,7 +1345,7 @@
           <a:p>
             <a:fld id="{A4B2E03E-B9F4-48CD-BEDC-03BA93144C1F}" type="datetimeFigureOut">
               <a:rPr lang="en-GB" smtClean="0"/>
-              <a:t>26/02/2020</a:t>
+              <a:t>19/05/2020</a:t>
             </a:fld>
             <a:endParaRPr lang="en-GB"/>
           </a:p>
@@ -1515,7 +1515,7 @@
           <a:p>
             <a:fld id="{A4B2E03E-B9F4-48CD-BEDC-03BA93144C1F}" type="datetimeFigureOut">
               <a:rPr lang="en-GB" smtClean="0"/>
-              <a:t>26/02/2020</a:t>
+              <a:t>19/05/2020</a:t>
             </a:fld>
             <a:endParaRPr lang="en-GB"/>
           </a:p>
@@ -1761,7 +1761,7 @@
           <a:p>
             <a:fld id="{A4B2E03E-B9F4-48CD-BEDC-03BA93144C1F}" type="datetimeFigureOut">
               <a:rPr lang="en-GB" smtClean="0"/>
-              <a:t>26/02/2020</a:t>
+              <a:t>19/05/2020</a:t>
             </a:fld>
             <a:endParaRPr lang="en-GB"/>
           </a:p>
@@ -1993,7 +1993,7 @@
           <a:p>
             <a:fld id="{A4B2E03E-B9F4-48CD-BEDC-03BA93144C1F}" type="datetimeFigureOut">
               <a:rPr lang="en-GB" smtClean="0"/>
-              <a:t>26/02/2020</a:t>
+              <a:t>19/05/2020</a:t>
             </a:fld>
             <a:endParaRPr lang="en-GB"/>
           </a:p>
@@ -2360,7 +2360,7 @@
           <a:p>
             <a:fld id="{A4B2E03E-B9F4-48CD-BEDC-03BA93144C1F}" type="datetimeFigureOut">
               <a:rPr lang="en-GB" smtClean="0"/>
-              <a:t>26/02/2020</a:t>
+              <a:t>19/05/2020</a:t>
             </a:fld>
             <a:endParaRPr lang="en-GB"/>
           </a:p>
@@ -2478,7 +2478,7 @@
           <a:p>
             <a:fld id="{A4B2E03E-B9F4-48CD-BEDC-03BA93144C1F}" type="datetimeFigureOut">
               <a:rPr lang="en-GB" smtClean="0"/>
-              <a:t>26/02/2020</a:t>
+              <a:t>19/05/2020</a:t>
             </a:fld>
             <a:endParaRPr lang="en-GB"/>
           </a:p>
@@ -2573,7 +2573,7 @@
           <a:p>
             <a:fld id="{A4B2E03E-B9F4-48CD-BEDC-03BA93144C1F}" type="datetimeFigureOut">
               <a:rPr lang="en-GB" smtClean="0"/>
-              <a:t>26/02/2020</a:t>
+              <a:t>19/05/2020</a:t>
             </a:fld>
             <a:endParaRPr lang="en-GB"/>
           </a:p>
@@ -2850,7 +2850,7 @@
           <a:p>
             <a:fld id="{A4B2E03E-B9F4-48CD-BEDC-03BA93144C1F}" type="datetimeFigureOut">
               <a:rPr lang="en-GB" smtClean="0"/>
-              <a:t>26/02/2020</a:t>
+              <a:t>19/05/2020</a:t>
             </a:fld>
             <a:endParaRPr lang="en-GB"/>
           </a:p>
@@ -3103,7 +3103,7 @@
           <a:p>
             <a:fld id="{A4B2E03E-B9F4-48CD-BEDC-03BA93144C1F}" type="datetimeFigureOut">
               <a:rPr lang="en-GB" smtClean="0"/>
-              <a:t>26/02/2020</a:t>
+              <a:t>19/05/2020</a:t>
             </a:fld>
             <a:endParaRPr lang="en-GB"/>
           </a:p>
@@ -3316,7 +3316,7 @@
           <a:p>
             <a:fld id="{A4B2E03E-B9F4-48CD-BEDC-03BA93144C1F}" type="datetimeFigureOut">
               <a:rPr lang="en-GB" smtClean="0"/>
-              <a:t>26/02/2020</a:t>
+              <a:t>19/05/2020</a:t>
             </a:fld>
             <a:endParaRPr lang="en-GB"/>
           </a:p>
@@ -10804,15 +10804,20 @@
           <p:nvPr/>
         </p:nvPicPr>
         <p:blipFill>
-          <a:blip r:embed="rId2"/>
-          <a:stretch>
-            <a:fillRect/>
-          </a:stretch>
+          <a:blip r:embed="rId2">
+            <a:extLst>
+              <a:ext uri="{28A0092B-C50C-407E-A947-70E740481C1C}">
+                <a14:useLocalDpi xmlns:a14="http://schemas.microsoft.com/office/drawing/2010/main" val="0"/>
+              </a:ext>
+            </a:extLst>
+          </a:blip>
+          <a:srcRect/>
+          <a:stretch/>
         </p:blipFill>
         <p:spPr>
           <a:xfrm>
-            <a:off x="521193" y="2867850"/>
-            <a:ext cx="11149614" cy="3050764"/>
+            <a:off x="2273411" y="2867850"/>
+            <a:ext cx="7645178" cy="3050764"/>
           </a:xfrm>
           <a:prstGeom prst="rect">
             <a:avLst/>
@@ -10861,7 +10866,7 @@
         </p:nvGrpSpPr>
         <p:grpSpPr>
           <a:xfrm>
-            <a:off x="305722" y="1907973"/>
+            <a:off x="1828742" y="2048646"/>
             <a:ext cx="1686992" cy="1684585"/>
             <a:chOff x="3539320" y="-956251"/>
             <a:chExt cx="1686992" cy="1684585"/>
@@ -10973,7 +10978,7 @@
         </p:nvGrpSpPr>
         <p:grpSpPr>
           <a:xfrm>
-            <a:off x="3060295" y="2180670"/>
+            <a:off x="5187721" y="2048646"/>
             <a:ext cx="1686992" cy="2560006"/>
             <a:chOff x="3539320" y="-956251"/>
             <a:chExt cx="1686992" cy="2560006"/>
@@ -11073,10 +11078,10 @@
       </p:grpSp>
       <p:grpSp>
         <p:nvGrpSpPr>
-          <p:cNvPr id="16" name="Group 15">
+          <p:cNvPr id="6" name="Group 5">
             <a:extLst>
               <a:ext uri="{FF2B5EF4-FFF2-40B4-BE49-F238E27FC236}">
-                <a16:creationId xmlns:a16="http://schemas.microsoft.com/office/drawing/2014/main" id="{A4D90DFB-E08B-48C6-81DA-C7E7E560DB76}"/>
+                <a16:creationId xmlns:a16="http://schemas.microsoft.com/office/drawing/2014/main" id="{7335EA12-4E85-4570-90AC-A5DE776366B1}"/>
               </a:ext>
             </a:extLst>
           </p:cNvPr>
@@ -11085,10 +11090,10 @@
         </p:nvGrpSpPr>
         <p:grpSpPr>
           <a:xfrm>
-            <a:off x="7444715" y="1541666"/>
-            <a:ext cx="1686992" cy="2784674"/>
-            <a:chOff x="3517076" y="-1264023"/>
-            <a:chExt cx="1686992" cy="2784674"/>
+            <a:off x="6484330" y="1541666"/>
+            <a:ext cx="2647377" cy="3774668"/>
+            <a:chOff x="6484330" y="1541666"/>
+            <a:chExt cx="2647377" cy="3774668"/>
           </a:xfrm>
         </p:grpSpPr>
         <p:sp>
@@ -11105,7 +11110,7 @@
           </p:nvSpPr>
           <p:spPr>
             <a:xfrm>
-              <a:off x="3517076" y="-1264023"/>
+              <a:off x="7444715" y="1541666"/>
               <a:ext cx="1686992" cy="639004"/>
             </a:xfrm>
             <a:prstGeom prst="roundRect">
@@ -11156,9 +11161,9 @@
             <p:nvPr/>
           </p:nvCxnSpPr>
           <p:spPr>
-            <a:xfrm>
-              <a:off x="4360572" y="-625019"/>
-              <a:ext cx="507272" cy="2145670"/>
+            <a:xfrm flipH="1">
+              <a:off x="6484330" y="2180670"/>
+              <a:ext cx="1803881" cy="2496661"/>
             </a:xfrm>
             <a:prstGeom prst="straightConnector1">
               <a:avLst/>
@@ -11182,137 +11187,25 @@
             </a:fontRef>
           </p:style>
         </p:cxnSp>
-      </p:grpSp>
-      <p:cxnSp>
-        <p:nvCxnSpPr>
-          <p:cNvPr id="20" name="Straight Arrow Connector 19">
-            <a:extLst>
-              <a:ext uri="{FF2B5EF4-FFF2-40B4-BE49-F238E27FC236}">
-                <a16:creationId xmlns:a16="http://schemas.microsoft.com/office/drawing/2014/main" id="{A06321FD-2137-45D7-86AB-55CF2844FE7D}"/>
-              </a:ext>
-            </a:extLst>
-          </p:cNvPr>
-          <p:cNvCxnSpPr>
-            <a:cxnSpLocks/>
-            <a:stCxn id="17" idx="2"/>
-          </p:cNvCxnSpPr>
-          <p:nvPr/>
-        </p:nvCxnSpPr>
-        <p:spPr>
-          <a:xfrm>
-            <a:off x="8288211" y="2180670"/>
-            <a:ext cx="1163203" cy="2852969"/>
-          </a:xfrm>
-          <a:prstGeom prst="straightConnector1">
-            <a:avLst/>
-          </a:prstGeom>
-          <a:ln w="12700">
-            <a:tailEnd type="triangle"/>
-          </a:ln>
-        </p:spPr>
-        <p:style>
-          <a:lnRef idx="1">
-            <a:schemeClr val="accent1"/>
-          </a:lnRef>
-          <a:fillRef idx="0">
-            <a:schemeClr val="accent1"/>
-          </a:fillRef>
-          <a:effectRef idx="0">
-            <a:schemeClr val="accent1"/>
-          </a:effectRef>
-          <a:fontRef idx="minor">
-            <a:schemeClr val="tx1"/>
-          </a:fontRef>
-        </p:style>
-      </p:cxnSp>
-      <p:grpSp>
-        <p:nvGrpSpPr>
-          <p:cNvPr id="25" name="Group 24">
-            <a:extLst>
-              <a:ext uri="{FF2B5EF4-FFF2-40B4-BE49-F238E27FC236}">
-                <a16:creationId xmlns:a16="http://schemas.microsoft.com/office/drawing/2014/main" id="{CB0D67AE-0C67-4FA5-830D-86661EA061E9}"/>
-              </a:ext>
-            </a:extLst>
-          </p:cNvPr>
-          <p:cNvGrpSpPr/>
-          <p:nvPr/>
-        </p:nvGrpSpPr>
-        <p:grpSpPr>
-          <a:xfrm>
-            <a:off x="9701709" y="1283162"/>
-            <a:ext cx="1812452" cy="2915976"/>
-            <a:chOff x="3539320" y="-956251"/>
-            <a:chExt cx="1812452" cy="2915976"/>
-          </a:xfrm>
-        </p:grpSpPr>
-        <p:sp>
-          <p:nvSpPr>
-            <p:cNvPr id="26" name="Rectangle: Rounded Corners 25">
+        <p:cxnSp>
+          <p:nvCxnSpPr>
+            <p:cNvPr id="20" name="Straight Arrow Connector 19">
               <a:extLst>
                 <a:ext uri="{FF2B5EF4-FFF2-40B4-BE49-F238E27FC236}">
-                  <a16:creationId xmlns:a16="http://schemas.microsoft.com/office/drawing/2014/main" id="{B5415190-7B88-4F9D-A4B0-6448EFD3158C}"/>
-                </a:ext>
-              </a:extLst>
-            </p:cNvPr>
-            <p:cNvSpPr/>
-            <p:nvPr/>
-          </p:nvSpPr>
-          <p:spPr>
-            <a:xfrm>
-              <a:off x="3539320" y="-956251"/>
-              <a:ext cx="1812452" cy="1086999"/>
-            </a:xfrm>
-            <a:prstGeom prst="roundRect">
-              <a:avLst/>
-            </a:prstGeom>
-          </p:spPr>
-          <p:style>
-            <a:lnRef idx="2">
-              <a:schemeClr val="accent1">
-                <a:shade val="50000"/>
-              </a:schemeClr>
-            </a:lnRef>
-            <a:fillRef idx="1">
-              <a:schemeClr val="accent1"/>
-            </a:fillRef>
-            <a:effectRef idx="0">
-              <a:schemeClr val="accent1"/>
-            </a:effectRef>
-            <a:fontRef idx="minor">
-              <a:schemeClr val="lt1"/>
-            </a:fontRef>
-          </p:style>
-          <p:txBody>
-            <a:bodyPr rtlCol="0" anchor="ctr"/>
-            <a:lstStyle/>
-            <a:p>
-              <a:pPr algn="ctr"/>
-              <a:r>
-                <a:rPr lang="en-GB" sz="1200" dirty="0"/>
-                <a:t>The system will decide an appropriate caching strategy if a Caching DB has been set (not in this example)</a:t>
-              </a:r>
-            </a:p>
-          </p:txBody>
-        </p:sp>
-        <p:cxnSp>
-          <p:nvCxnSpPr>
-            <p:cNvPr id="27" name="Straight Arrow Connector 26">
-              <a:extLst>
-                <a:ext uri="{FF2B5EF4-FFF2-40B4-BE49-F238E27FC236}">
-                  <a16:creationId xmlns:a16="http://schemas.microsoft.com/office/drawing/2014/main" id="{24245E15-E032-4F8D-B834-40BD693EAE32}"/>
+                  <a16:creationId xmlns:a16="http://schemas.microsoft.com/office/drawing/2014/main" id="{A06321FD-2137-45D7-86AB-55CF2844FE7D}"/>
                 </a:ext>
               </a:extLst>
             </p:cNvPr>
             <p:cNvCxnSpPr>
               <a:cxnSpLocks/>
-              <a:stCxn id="26" idx="2"/>
+              <a:stCxn id="17" idx="2"/>
             </p:cNvCxnSpPr>
             <p:nvPr/>
           </p:nvCxnSpPr>
           <p:spPr>
-            <a:xfrm>
-              <a:off x="4445546" y="130748"/>
-              <a:ext cx="613440" cy="1828977"/>
+            <a:xfrm flipH="1">
+              <a:off x="6999860" y="2180670"/>
+              <a:ext cx="1288351" cy="3135664"/>
             </a:xfrm>
             <a:prstGeom prst="straightConnector1">
               <a:avLst/>
@@ -18362,109 +18255,41 @@
           </a:p>
         </p:txBody>
       </p:sp>
-      <p:grpSp>
-        <p:nvGrpSpPr>
-          <p:cNvPr id="6" name="Group 5">
+      <p:pic>
+        <p:nvPicPr>
+          <p:cNvPr id="4" name="Picture 3">
             <a:extLst>
               <a:ext uri="{FF2B5EF4-FFF2-40B4-BE49-F238E27FC236}">
-                <a16:creationId xmlns:a16="http://schemas.microsoft.com/office/drawing/2014/main" id="{4E931C77-B4C2-4BEA-99D2-DBAF71335FE1}"/>
+                <a16:creationId xmlns:a16="http://schemas.microsoft.com/office/drawing/2014/main" id="{8A28FF46-027F-4C3A-845E-D228C64AD932}"/>
               </a:ext>
             </a:extLst>
           </p:cNvPr>
-          <p:cNvGrpSpPr/>
+          <p:cNvPicPr>
+            <a:picLocks noChangeAspect="1"/>
+          </p:cNvPicPr>
           <p:nvPr/>
-        </p:nvGrpSpPr>
-        <p:grpSpPr>
+        </p:nvPicPr>
+        <p:blipFill>
+          <a:blip r:embed="rId3">
+            <a:extLst>
+              <a:ext uri="{28A0092B-C50C-407E-A947-70E740481C1C}">
+                <a14:useLocalDpi xmlns:a14="http://schemas.microsoft.com/office/drawing/2010/main" val="0"/>
+              </a:ext>
+            </a:extLst>
+          </a:blip>
+          <a:srcRect/>
+          <a:stretch/>
+        </p:blipFill>
+        <p:spPr>
           <a:xfrm>
-            <a:off x="4939860" y="1690688"/>
-            <a:ext cx="6958281" cy="4390297"/>
-            <a:chOff x="4939860" y="1690688"/>
-            <a:chExt cx="6958281" cy="4390297"/>
+            <a:off x="4939860" y="2459636"/>
+            <a:ext cx="6958281" cy="2852401"/>
           </a:xfrm>
-        </p:grpSpPr>
-        <p:pic>
-          <p:nvPicPr>
-            <p:cNvPr id="4" name="Picture 3">
-              <a:extLst>
-                <a:ext uri="{FF2B5EF4-FFF2-40B4-BE49-F238E27FC236}">
-                  <a16:creationId xmlns:a16="http://schemas.microsoft.com/office/drawing/2014/main" id="{8A28FF46-027F-4C3A-845E-D228C64AD932}"/>
-                </a:ext>
-              </a:extLst>
-            </p:cNvPr>
-            <p:cNvPicPr>
-              <a:picLocks noChangeAspect="1"/>
-            </p:cNvPicPr>
-            <p:nvPr/>
-          </p:nvPicPr>
-          <p:blipFill>
-            <a:blip r:embed="rId3"/>
-            <a:stretch>
-              <a:fillRect/>
-            </a:stretch>
-          </p:blipFill>
-          <p:spPr>
-            <a:xfrm>
-              <a:off x="4939860" y="1690688"/>
-              <a:ext cx="6958281" cy="4390297"/>
-            </a:xfrm>
-            <a:prstGeom prst="rect">
-              <a:avLst/>
-            </a:prstGeom>
-          </p:spPr>
-        </p:pic>
-        <p:sp>
-          <p:nvSpPr>
-            <p:cNvPr id="5" name="Rectangle: Rounded Corners 4">
-              <a:extLst>
-                <a:ext uri="{FF2B5EF4-FFF2-40B4-BE49-F238E27FC236}">
-                  <a16:creationId xmlns:a16="http://schemas.microsoft.com/office/drawing/2014/main" id="{ED05FC29-8B5F-4538-858A-6658FF51E050}"/>
-                </a:ext>
-              </a:extLst>
-            </p:cNvPr>
-            <p:cNvSpPr/>
-            <p:nvPr/>
-          </p:nvSpPr>
-          <p:spPr>
-            <a:xfrm>
-              <a:off x="8384275" y="3152633"/>
-              <a:ext cx="3421038" cy="267268"/>
-            </a:xfrm>
-            <a:prstGeom prst="roundRect">
-              <a:avLst/>
-            </a:prstGeom>
-            <a:noFill/>
-            <a:ln w="19050">
-              <a:solidFill>
-                <a:srgbClr val="C00000"/>
-              </a:solidFill>
-            </a:ln>
-          </p:spPr>
-          <p:style>
-            <a:lnRef idx="2">
-              <a:schemeClr val="accent1">
-                <a:shade val="50000"/>
-              </a:schemeClr>
-            </a:lnRef>
-            <a:fillRef idx="1">
-              <a:schemeClr val="accent1"/>
-            </a:fillRef>
-            <a:effectRef idx="0">
-              <a:schemeClr val="accent1"/>
-            </a:effectRef>
-            <a:fontRef idx="minor">
-              <a:schemeClr val="lt1"/>
-            </a:fontRef>
-          </p:style>
-          <p:txBody>
-            <a:bodyPr rtlCol="0" anchor="ctr"/>
-            <a:lstStyle/>
-            <a:p>
-              <a:pPr algn="ctr"/>
-              <a:endParaRPr lang="en-GB"/>
-            </a:p>
-          </p:txBody>
-        </p:sp>
-      </p:grpSp>
+          <a:prstGeom prst="rect">
+            <a:avLst/>
+          </a:prstGeom>
+        </p:spPr>
+      </p:pic>
       <p:grpSp>
         <p:nvGrpSpPr>
           <p:cNvPr id="14" name="Group 13">
@@ -18791,41 +18616,6 @@
                                   </p:childTnLst>
                                 </p:cTn>
                               </p:par>
-                              <p:par>
-                                <p:cTn id="8" presetID="10" presetClass="entr" presetSubtype="0" fill="hold" nodeType="withEffect">
-                                  <p:stCondLst>
-                                    <p:cond delay="0"/>
-                                  </p:stCondLst>
-                                  <p:childTnLst>
-                                    <p:set>
-                                      <p:cBhvr>
-                                        <p:cTn id="9" dur="1" fill="hold">
-                                          <p:stCondLst>
-                                            <p:cond delay="0"/>
-                                          </p:stCondLst>
-                                        </p:cTn>
-                                        <p:tgtEl>
-                                          <p:spTgt spid="6"/>
-                                        </p:tgtEl>
-                                        <p:attrNameLst>
-                                          <p:attrName>style.visibility</p:attrName>
-                                        </p:attrNameLst>
-                                      </p:cBhvr>
-                                      <p:to>
-                                        <p:strVal val="visible"/>
-                                      </p:to>
-                                    </p:set>
-                                    <p:animEffect transition="in" filter="fade">
-                                      <p:cBhvr>
-                                        <p:cTn id="10" dur="500"/>
-                                        <p:tgtEl>
-                                          <p:spTgt spid="6"/>
-                                        </p:tgtEl>
-                                      </p:cBhvr>
-                                    </p:animEffect>
-                                  </p:childTnLst>
-                                </p:cTn>
-                              </p:par>
                             </p:childTnLst>
                           </p:cTn>
                         </p:par>
@@ -18833,26 +18623,26 @@
                     </p:cTn>
                   </p:par>
                   <p:par>
-                    <p:cTn id="11" fill="hold">
+                    <p:cTn id="8" fill="hold">
                       <p:stCondLst>
                         <p:cond delay="indefinite"/>
                       </p:stCondLst>
                       <p:childTnLst>
                         <p:par>
-                          <p:cTn id="12" fill="hold">
+                          <p:cTn id="9" fill="hold">
                             <p:stCondLst>
                               <p:cond delay="0"/>
                             </p:stCondLst>
                             <p:childTnLst>
                               <p:par>
-                                <p:cTn id="13" presetID="10" presetClass="exit" presetSubtype="0" fill="hold" grpId="1" nodeType="clickEffect">
+                                <p:cTn id="10" presetID="10" presetClass="exit" presetSubtype="0" fill="hold" grpId="1" nodeType="clickEffect">
                                   <p:stCondLst>
                                     <p:cond delay="0"/>
                                   </p:stCondLst>
                                   <p:childTnLst>
                                     <p:animEffect transition="out" filter="fade">
                                       <p:cBhvr>
-                                        <p:cTn id="14" dur="500"/>
+                                        <p:cTn id="11" dur="500"/>
                                         <p:tgtEl>
                                           <p:spTgt spid="3">
                                             <p:txEl>
@@ -18864,7 +18654,7 @@
                                     </p:animEffect>
                                     <p:set>
                                       <p:cBhvr>
-                                        <p:cTn id="15" dur="1" fill="hold">
+                                        <p:cTn id="12" dur="1" fill="hold">
                                           <p:stCondLst>
                                             <p:cond delay="499"/>
                                           </p:stCondLst>
@@ -18888,49 +18678,14 @@
                                 </p:cTn>
                               </p:par>
                               <p:par>
-                                <p:cTn id="16" presetID="10" presetClass="exit" presetSubtype="0" fill="hold" nodeType="withEffect">
-                                  <p:stCondLst>
-                                    <p:cond delay="0"/>
-                                  </p:stCondLst>
-                                  <p:childTnLst>
-                                    <p:animEffect transition="out" filter="fade">
-                                      <p:cBhvr>
-                                        <p:cTn id="17" dur="500"/>
-                                        <p:tgtEl>
-                                          <p:spTgt spid="6"/>
-                                        </p:tgtEl>
-                                      </p:cBhvr>
-                                    </p:animEffect>
-                                    <p:set>
-                                      <p:cBhvr>
-                                        <p:cTn id="18" dur="1" fill="hold">
-                                          <p:stCondLst>
-                                            <p:cond delay="499"/>
-                                          </p:stCondLst>
-                                        </p:cTn>
-                                        <p:tgtEl>
-                                          <p:spTgt spid="6"/>
-                                        </p:tgtEl>
-                                        <p:attrNameLst>
-                                          <p:attrName>style.visibility</p:attrName>
-                                        </p:attrNameLst>
-                                      </p:cBhvr>
-                                      <p:to>
-                                        <p:strVal val="hidden"/>
-                                      </p:to>
-                                    </p:set>
-                                  </p:childTnLst>
-                                </p:cTn>
-                              </p:par>
-                              <p:par>
-                                <p:cTn id="19" presetID="10" presetClass="entr" presetSubtype="0" fill="hold" grpId="0" nodeType="withEffect">
+                                <p:cTn id="13" presetID="10" presetClass="entr" presetSubtype="0" fill="hold" grpId="0" nodeType="withEffect">
                                   <p:stCondLst>
                                     <p:cond delay="0"/>
                                   </p:stCondLst>
                                   <p:childTnLst>
                                     <p:set>
                                       <p:cBhvr>
-                                        <p:cTn id="20" dur="1" fill="hold">
+                                        <p:cTn id="14" dur="1" fill="hold">
                                           <p:stCondLst>
                                             <p:cond delay="0"/>
                                           </p:stCondLst>
@@ -18952,7 +18707,7 @@
                                     </p:set>
                                     <p:animEffect transition="in" filter="fade">
                                       <p:cBhvr>
-                                        <p:cTn id="21" dur="500"/>
+                                        <p:cTn id="15" dur="500"/>
                                         <p:tgtEl>
                                           <p:spTgt spid="3">
                                             <p:txEl>
@@ -18966,14 +18721,14 @@
                                 </p:cTn>
                               </p:par>
                               <p:par>
-                                <p:cTn id="22" presetID="10" presetClass="entr" presetSubtype="0" fill="hold" nodeType="withEffect">
+                                <p:cTn id="16" presetID="10" presetClass="entr" presetSubtype="0" fill="hold" nodeType="withEffect">
                                   <p:stCondLst>
                                     <p:cond delay="0"/>
                                   </p:stCondLst>
                                   <p:childTnLst>
                                     <p:set>
                                       <p:cBhvr>
-                                        <p:cTn id="23" dur="1" fill="hold">
+                                        <p:cTn id="17" dur="1" fill="hold">
                                           <p:stCondLst>
                                             <p:cond delay="0"/>
                                           </p:stCondLst>
@@ -18991,7 +18746,7 @@
                                     </p:set>
                                     <p:animEffect transition="in" filter="fade">
                                       <p:cBhvr>
-                                        <p:cTn id="24" dur="500"/>
+                                        <p:cTn id="18" dur="500"/>
                                         <p:tgtEl>
                                           <p:spTgt spid="14"/>
                                         </p:tgtEl>
@@ -19007,26 +18762,26 @@
                     </p:cTn>
                   </p:par>
                   <p:par>
-                    <p:cTn id="25" fill="hold">
+                    <p:cTn id="19" fill="hold">
                       <p:stCondLst>
                         <p:cond delay="indefinite"/>
                       </p:stCondLst>
                       <p:childTnLst>
                         <p:par>
-                          <p:cTn id="26" fill="hold">
+                          <p:cTn id="20" fill="hold">
                             <p:stCondLst>
                               <p:cond delay="0"/>
                             </p:stCondLst>
                             <p:childTnLst>
                               <p:par>
-                                <p:cTn id="27" presetID="10" presetClass="exit" presetSubtype="0" fill="hold" grpId="1" nodeType="clickEffect">
+                                <p:cTn id="21" presetID="10" presetClass="exit" presetSubtype="0" fill="hold" grpId="1" nodeType="clickEffect">
                                   <p:stCondLst>
                                     <p:cond delay="0"/>
                                   </p:stCondLst>
                                   <p:childTnLst>
                                     <p:animEffect transition="out" filter="fade">
                                       <p:cBhvr>
-                                        <p:cTn id="28" dur="500"/>
+                                        <p:cTn id="22" dur="500"/>
                                         <p:tgtEl>
                                           <p:spTgt spid="3">
                                             <p:txEl>
@@ -19038,7 +18793,7 @@
                                     </p:animEffect>
                                     <p:set>
                                       <p:cBhvr>
-                                        <p:cTn id="29" dur="1" fill="hold">
+                                        <p:cTn id="23" dur="1" fill="hold">
                                           <p:stCondLst>
                                             <p:cond delay="499"/>
                                           </p:stCondLst>
@@ -19062,14 +18817,14 @@
                                 </p:cTn>
                               </p:par>
                               <p:par>
-                                <p:cTn id="30" presetID="10" presetClass="exit" presetSubtype="0" fill="hold" nodeType="withEffect">
+                                <p:cTn id="24" presetID="10" presetClass="exit" presetSubtype="0" fill="hold" nodeType="withEffect">
                                   <p:stCondLst>
                                     <p:cond delay="0"/>
                                   </p:stCondLst>
                                   <p:childTnLst>
                                     <p:animEffect transition="out" filter="fade">
                                       <p:cBhvr>
-                                        <p:cTn id="31" dur="500"/>
+                                        <p:cTn id="25" dur="500"/>
                                         <p:tgtEl>
                                           <p:spTgt spid="14"/>
                                         </p:tgtEl>
@@ -19077,7 +18832,7 @@
                                     </p:animEffect>
                                     <p:set>
                                       <p:cBhvr>
-                                        <p:cTn id="32" dur="1" fill="hold">
+                                        <p:cTn id="26" dur="1" fill="hold">
                                           <p:stCondLst>
                                             <p:cond delay="499"/>
                                           </p:stCondLst>
@@ -19097,14 +18852,14 @@
                                 </p:cTn>
                               </p:par>
                               <p:par>
-                                <p:cTn id="33" presetID="10" presetClass="entr" presetSubtype="0" fill="hold" grpId="0" nodeType="withEffect">
+                                <p:cTn id="27" presetID="10" presetClass="entr" presetSubtype="0" fill="hold" grpId="0" nodeType="withEffect">
                                   <p:stCondLst>
                                     <p:cond delay="0"/>
                                   </p:stCondLst>
                                   <p:childTnLst>
                                     <p:set>
                                       <p:cBhvr>
-                                        <p:cTn id="34" dur="1" fill="hold">
+                                        <p:cTn id="28" dur="1" fill="hold">
                                           <p:stCondLst>
                                             <p:cond delay="0"/>
                                           </p:stCondLst>
@@ -19126,7 +18881,7 @@
                                     </p:set>
                                     <p:animEffect transition="in" filter="fade">
                                       <p:cBhvr>
-                                        <p:cTn id="35" dur="500"/>
+                                        <p:cTn id="29" dur="500"/>
                                         <p:tgtEl>
                                           <p:spTgt spid="3">
                                             <p:txEl>
@@ -19140,14 +18895,14 @@
                                 </p:cTn>
                               </p:par>
                               <p:par>
-                                <p:cTn id="36" presetID="10" presetClass="entr" presetSubtype="0" fill="hold" nodeType="withEffect">
+                                <p:cTn id="30" presetID="10" presetClass="entr" presetSubtype="0" fill="hold" nodeType="withEffect">
                                   <p:stCondLst>
                                     <p:cond delay="0"/>
                                   </p:stCondLst>
                                   <p:childTnLst>
                                     <p:set>
                                       <p:cBhvr>
-                                        <p:cTn id="37" dur="1" fill="hold">
+                                        <p:cTn id="31" dur="1" fill="hold">
                                           <p:stCondLst>
                                             <p:cond delay="0"/>
                                           </p:stCondLst>
@@ -19165,7 +18920,7 @@
                                     </p:set>
                                     <p:animEffect transition="in" filter="fade">
                                       <p:cBhvr>
-                                        <p:cTn id="38" dur="500"/>
+                                        <p:cTn id="32" dur="500"/>
                                         <p:tgtEl>
                                           <p:spTgt spid="20"/>
                                         </p:tgtEl>
@@ -20305,15 +20060,20 @@
           <p:nvPr/>
         </p:nvPicPr>
         <p:blipFill>
-          <a:blip r:embed="rId2"/>
-          <a:stretch>
-            <a:fillRect/>
-          </a:stretch>
+          <a:blip r:embed="rId2">
+            <a:extLst>
+              <a:ext uri="{28A0092B-C50C-407E-A947-70E740481C1C}">
+                <a14:useLocalDpi xmlns:a14="http://schemas.microsoft.com/office/drawing/2010/main" val="0"/>
+              </a:ext>
+            </a:extLst>
+          </a:blip>
+          <a:srcRect/>
+          <a:stretch/>
         </p:blipFill>
         <p:spPr>
           <a:xfrm>
-            <a:off x="1878914" y="1418886"/>
-            <a:ext cx="9882260" cy="4948274"/>
+            <a:off x="1878914" y="1537850"/>
+            <a:ext cx="9882260" cy="4710346"/>
           </a:xfrm>
           <a:prstGeom prst="rect">
             <a:avLst/>
@@ -20362,9 +20122,9 @@
         </p:nvGrpSpPr>
         <p:grpSpPr>
           <a:xfrm>
-            <a:off x="2833261" y="2720614"/>
+            <a:off x="4215626" y="3315287"/>
             <a:ext cx="2841723" cy="1308309"/>
-            <a:chOff x="2516033" y="857035"/>
+            <a:chOff x="3898398" y="1451708"/>
             <a:chExt cx="2841723" cy="1308309"/>
           </a:xfrm>
         </p:grpSpPr>
@@ -20382,7 +20142,7 @@
           </p:nvSpPr>
           <p:spPr>
             <a:xfrm>
-              <a:off x="4174950" y="857035"/>
+              <a:off x="5557315" y="1451708"/>
               <a:ext cx="1182806" cy="315446"/>
             </a:xfrm>
             <a:prstGeom prst="roundRect">
@@ -20434,120 +20194,8 @@
           </p:nvCxnSpPr>
           <p:spPr>
             <a:xfrm flipH="1">
-              <a:off x="2516033" y="1172481"/>
+              <a:off x="3898398" y="1767154"/>
               <a:ext cx="2250320" cy="992863"/>
-            </a:xfrm>
-            <a:prstGeom prst="straightConnector1">
-              <a:avLst/>
-            </a:prstGeom>
-            <a:ln w="12700">
-              <a:tailEnd type="triangle"/>
-            </a:ln>
-          </p:spPr>
-          <p:style>
-            <a:lnRef idx="1">
-              <a:schemeClr val="accent1"/>
-            </a:lnRef>
-            <a:fillRef idx="0">
-              <a:schemeClr val="accent1"/>
-            </a:fillRef>
-            <a:effectRef idx="0">
-              <a:schemeClr val="accent1"/>
-            </a:effectRef>
-            <a:fontRef idx="minor">
-              <a:schemeClr val="tx1"/>
-            </a:fontRef>
-          </p:style>
-        </p:cxnSp>
-      </p:grpSp>
-      <p:grpSp>
-        <p:nvGrpSpPr>
-          <p:cNvPr id="8" name="Group 7">
-            <a:extLst>
-              <a:ext uri="{FF2B5EF4-FFF2-40B4-BE49-F238E27FC236}">
-                <a16:creationId xmlns:a16="http://schemas.microsoft.com/office/drawing/2014/main" id="{72AFEF8A-7E77-4DF0-93C9-10E78C7E941D}"/>
-              </a:ext>
-            </a:extLst>
-          </p:cNvPr>
-          <p:cNvGrpSpPr/>
-          <p:nvPr/>
-        </p:nvGrpSpPr>
-        <p:grpSpPr>
-          <a:xfrm>
-            <a:off x="3166281" y="4191318"/>
-            <a:ext cx="2028967" cy="380227"/>
-            <a:chOff x="4847513" y="1837899"/>
-            <a:chExt cx="2028967" cy="380227"/>
-          </a:xfrm>
-        </p:grpSpPr>
-        <p:sp>
-          <p:nvSpPr>
-            <p:cNvPr id="9" name="Rectangle: Rounded Corners 8">
-              <a:extLst>
-                <a:ext uri="{FF2B5EF4-FFF2-40B4-BE49-F238E27FC236}">
-                  <a16:creationId xmlns:a16="http://schemas.microsoft.com/office/drawing/2014/main" id="{737F2CBF-44EF-4A21-9FCF-E0997943F98A}"/>
-                </a:ext>
-              </a:extLst>
-            </p:cNvPr>
-            <p:cNvSpPr/>
-            <p:nvPr/>
-          </p:nvSpPr>
-          <p:spPr>
-            <a:xfrm>
-              <a:off x="5693674" y="1837899"/>
-              <a:ext cx="1182806" cy="315446"/>
-            </a:xfrm>
-            <a:prstGeom prst="roundRect">
-              <a:avLst/>
-            </a:prstGeom>
-          </p:spPr>
-          <p:style>
-            <a:lnRef idx="2">
-              <a:schemeClr val="accent1">
-                <a:shade val="50000"/>
-              </a:schemeClr>
-            </a:lnRef>
-            <a:fillRef idx="1">
-              <a:schemeClr val="accent1"/>
-            </a:fillRef>
-            <a:effectRef idx="0">
-              <a:schemeClr val="accent1"/>
-            </a:effectRef>
-            <a:fontRef idx="minor">
-              <a:schemeClr val="lt1"/>
-            </a:fontRef>
-          </p:style>
-          <p:txBody>
-            <a:bodyPr rtlCol="0" anchor="ctr"/>
-            <a:lstStyle/>
-            <a:p>
-              <a:pPr algn="ctr"/>
-              <a:r>
-                <a:rPr lang="en-GB" sz="1200" dirty="0"/>
-                <a:t>Filters</a:t>
-              </a:r>
-            </a:p>
-          </p:txBody>
-        </p:sp>
-        <p:cxnSp>
-          <p:nvCxnSpPr>
-            <p:cNvPr id="10" name="Straight Arrow Connector 9">
-              <a:extLst>
-                <a:ext uri="{FF2B5EF4-FFF2-40B4-BE49-F238E27FC236}">
-                  <a16:creationId xmlns:a16="http://schemas.microsoft.com/office/drawing/2014/main" id="{44E1AA92-BBCB-4B97-BA5A-85AC2FF166AE}"/>
-                </a:ext>
-              </a:extLst>
-            </p:cNvPr>
-            <p:cNvCxnSpPr>
-              <a:cxnSpLocks/>
-              <a:stCxn id="9" idx="1"/>
-            </p:cNvCxnSpPr>
-            <p:nvPr/>
-          </p:nvCxnSpPr>
-          <p:spPr>
-            <a:xfrm flipH="1">
-              <a:off x="4847513" y="1995622"/>
-              <a:ext cx="846161" cy="222504"/>
             </a:xfrm>
             <a:prstGeom prst="straightConnector1">
               <a:avLst/>
@@ -20586,7 +20234,7 @@
         </p:nvGrpSpPr>
         <p:grpSpPr>
           <a:xfrm>
-            <a:off x="128301" y="4904096"/>
+            <a:off x="215387" y="5420460"/>
             <a:ext cx="2432929" cy="577222"/>
             <a:chOff x="5004180" y="575287"/>
             <a:chExt cx="2432929" cy="577222"/>
@@ -20698,7 +20346,7 @@
         </p:nvGrpSpPr>
         <p:grpSpPr>
           <a:xfrm>
-            <a:off x="105555" y="3554803"/>
+            <a:off x="136014" y="4028923"/>
             <a:ext cx="2254799" cy="507423"/>
             <a:chOff x="3339153" y="690579"/>
             <a:chExt cx="2254799" cy="507423"/>
@@ -20772,6 +20420,159 @@
             <a:xfrm>
               <a:off x="5026145" y="944291"/>
               <a:ext cx="567807" cy="84508"/>
+            </a:xfrm>
+            <a:prstGeom prst="straightConnector1">
+              <a:avLst/>
+            </a:prstGeom>
+            <a:ln w="12700">
+              <a:tailEnd type="triangle"/>
+            </a:ln>
+          </p:spPr>
+          <p:style>
+            <a:lnRef idx="1">
+              <a:schemeClr val="accent1"/>
+            </a:lnRef>
+            <a:fillRef idx="0">
+              <a:schemeClr val="accent1"/>
+            </a:fillRef>
+            <a:effectRef idx="0">
+              <a:schemeClr val="accent1"/>
+            </a:effectRef>
+            <a:fontRef idx="minor">
+              <a:schemeClr val="tx1"/>
+            </a:fontRef>
+          </p:style>
+        </p:cxnSp>
+      </p:grpSp>
+      <p:grpSp>
+        <p:nvGrpSpPr>
+          <p:cNvPr id="12" name="Group 11">
+            <a:extLst>
+              <a:ext uri="{FF2B5EF4-FFF2-40B4-BE49-F238E27FC236}">
+                <a16:creationId xmlns:a16="http://schemas.microsoft.com/office/drawing/2014/main" id="{6F89AA40-D20D-4791-A56E-BAF14F3E398B}"/>
+              </a:ext>
+            </a:extLst>
+          </p:cNvPr>
+          <p:cNvGrpSpPr/>
+          <p:nvPr/>
+        </p:nvGrpSpPr>
+        <p:grpSpPr>
+          <a:xfrm>
+            <a:off x="4005943" y="4713982"/>
+            <a:ext cx="2748139" cy="1082339"/>
+            <a:chOff x="4005943" y="4713982"/>
+            <a:chExt cx="2748139" cy="1082339"/>
+          </a:xfrm>
+        </p:grpSpPr>
+        <p:sp>
+          <p:nvSpPr>
+            <p:cNvPr id="9" name="Rectangle: Rounded Corners 8">
+              <a:extLst>
+                <a:ext uri="{FF2B5EF4-FFF2-40B4-BE49-F238E27FC236}">
+                  <a16:creationId xmlns:a16="http://schemas.microsoft.com/office/drawing/2014/main" id="{737F2CBF-44EF-4A21-9FCF-E0997943F98A}"/>
+                </a:ext>
+              </a:extLst>
+            </p:cNvPr>
+            <p:cNvSpPr/>
+            <p:nvPr/>
+          </p:nvSpPr>
+          <p:spPr>
+            <a:xfrm>
+              <a:off x="5571276" y="4713982"/>
+              <a:ext cx="1182806" cy="315446"/>
+            </a:xfrm>
+            <a:prstGeom prst="roundRect">
+              <a:avLst/>
+            </a:prstGeom>
+          </p:spPr>
+          <p:style>
+            <a:lnRef idx="2">
+              <a:schemeClr val="accent1">
+                <a:shade val="50000"/>
+              </a:schemeClr>
+            </a:lnRef>
+            <a:fillRef idx="1">
+              <a:schemeClr val="accent1"/>
+            </a:fillRef>
+            <a:effectRef idx="0">
+              <a:schemeClr val="accent1"/>
+            </a:effectRef>
+            <a:fontRef idx="minor">
+              <a:schemeClr val="lt1"/>
+            </a:fontRef>
+          </p:style>
+          <p:txBody>
+            <a:bodyPr rtlCol="0" anchor="ctr"/>
+            <a:lstStyle/>
+            <a:p>
+              <a:pPr algn="ctr"/>
+              <a:r>
+                <a:rPr lang="en-GB" sz="1200" dirty="0"/>
+                <a:t>Filters</a:t>
+              </a:r>
+            </a:p>
+          </p:txBody>
+        </p:sp>
+        <p:cxnSp>
+          <p:nvCxnSpPr>
+            <p:cNvPr id="10" name="Straight Arrow Connector 9">
+              <a:extLst>
+                <a:ext uri="{FF2B5EF4-FFF2-40B4-BE49-F238E27FC236}">
+                  <a16:creationId xmlns:a16="http://schemas.microsoft.com/office/drawing/2014/main" id="{44E1AA92-BBCB-4B97-BA5A-85AC2FF166AE}"/>
+                </a:ext>
+              </a:extLst>
+            </p:cNvPr>
+            <p:cNvCxnSpPr>
+              <a:cxnSpLocks/>
+              <a:stCxn id="9" idx="1"/>
+            </p:cNvCxnSpPr>
+            <p:nvPr/>
+          </p:nvCxnSpPr>
+          <p:spPr>
+            <a:xfrm flipH="1">
+              <a:off x="4725115" y="4871705"/>
+              <a:ext cx="846161" cy="222504"/>
+            </a:xfrm>
+            <a:prstGeom prst="straightConnector1">
+              <a:avLst/>
+            </a:prstGeom>
+            <a:ln w="12700">
+              <a:tailEnd type="triangle"/>
+            </a:ln>
+          </p:spPr>
+          <p:style>
+            <a:lnRef idx="1">
+              <a:schemeClr val="accent1"/>
+            </a:lnRef>
+            <a:fillRef idx="0">
+              <a:schemeClr val="accent1"/>
+            </a:fillRef>
+            <a:effectRef idx="0">
+              <a:schemeClr val="accent1"/>
+            </a:effectRef>
+            <a:fontRef idx="minor">
+              <a:schemeClr val="tx1"/>
+            </a:fontRef>
+          </p:style>
+        </p:cxnSp>
+        <p:cxnSp>
+          <p:nvCxnSpPr>
+            <p:cNvPr id="21" name="Straight Arrow Connector 20">
+              <a:extLst>
+                <a:ext uri="{FF2B5EF4-FFF2-40B4-BE49-F238E27FC236}">
+                  <a16:creationId xmlns:a16="http://schemas.microsoft.com/office/drawing/2014/main" id="{E40AA806-DADF-4FEE-952F-C82AE21C3A9D}"/>
+                </a:ext>
+              </a:extLst>
+            </p:cNvPr>
+            <p:cNvCxnSpPr>
+              <a:cxnSpLocks/>
+            </p:cNvCxnSpPr>
+            <p:nvPr/>
+          </p:nvCxnSpPr>
+          <p:spPr>
+            <a:xfrm flipH="1">
+              <a:off x="4005943" y="4982957"/>
+              <a:ext cx="1621241" cy="813364"/>
             </a:xfrm>
             <a:prstGeom prst="straightConnector1">
               <a:avLst/>
@@ -20946,7 +20747,7 @@
                                           </p:stCondLst>
                                         </p:cTn>
                                         <p:tgtEl>
-                                          <p:spTgt spid="8"/>
+                                          <p:spTgt spid="14"/>
                                         </p:tgtEl>
                                         <p:attrNameLst>
                                           <p:attrName>style.visibility</p:attrName>
@@ -20959,59 +20760,6 @@
                                     <p:animEffect transition="in" filter="fade">
                                       <p:cBhvr>
                                         <p:cTn id="17" dur="500"/>
-                                        <p:tgtEl>
-                                          <p:spTgt spid="8"/>
-                                        </p:tgtEl>
-                                      </p:cBhvr>
-                                    </p:animEffect>
-                                  </p:childTnLst>
-                                </p:cTn>
-                              </p:par>
-                            </p:childTnLst>
-                          </p:cTn>
-                        </p:par>
-                      </p:childTnLst>
-                    </p:cTn>
-                  </p:par>
-                  <p:par>
-                    <p:cTn id="18" fill="hold">
-                      <p:stCondLst>
-                        <p:cond delay="indefinite"/>
-                      </p:stCondLst>
-                      <p:childTnLst>
-                        <p:par>
-                          <p:cTn id="19" fill="hold">
-                            <p:stCondLst>
-                              <p:cond delay="0"/>
-                            </p:stCondLst>
-                            <p:childTnLst>
-                              <p:par>
-                                <p:cTn id="20" presetID="10" presetClass="entr" presetSubtype="0" fill="hold" nodeType="clickEffect">
-                                  <p:stCondLst>
-                                    <p:cond delay="0"/>
-                                  </p:stCondLst>
-                                  <p:childTnLst>
-                                    <p:set>
-                                      <p:cBhvr>
-                                        <p:cTn id="21" dur="1" fill="hold">
-                                          <p:stCondLst>
-                                            <p:cond delay="0"/>
-                                          </p:stCondLst>
-                                        </p:cTn>
-                                        <p:tgtEl>
-                                          <p:spTgt spid="14"/>
-                                        </p:tgtEl>
-                                        <p:attrNameLst>
-                                          <p:attrName>style.visibility</p:attrName>
-                                        </p:attrNameLst>
-                                      </p:cBhvr>
-                                      <p:to>
-                                        <p:strVal val="visible"/>
-                                      </p:to>
-                                    </p:set>
-                                    <p:animEffect transition="in" filter="fade">
-                                      <p:cBhvr>
-                                        <p:cTn id="22" dur="500"/>
                                         <p:tgtEl>
                                           <p:spTgt spid="14"/>
                                         </p:tgtEl>
@@ -22015,8 +21763,8 @@
             </a:p>
           </p:txBody>
         </p:sp>
-        <mc:AlternateContent xmlns:mc="http://schemas.openxmlformats.org/markup-compatibility/2006">
-          <mc:Choice xmlns:a14="http://schemas.microsoft.com/office/drawing/2010/main" Requires="a14">
+        <mc:AlternateContent xmlns:mc="http://schemas.openxmlformats.org/markup-compatibility/2006" xmlns:a14="http://schemas.microsoft.com/office/drawing/2010/main">
+          <mc:Choice Requires="a14">
             <p:sp>
               <p:nvSpPr>
                 <p:cNvPr id="12" name="Freeform: Shape 11">
@@ -22239,7 +21987,7 @@
               </p:txBody>
             </p:sp>
           </mc:Choice>
-          <mc:Fallback>
+          <mc:Fallback xmlns="">
             <p:sp>
               <p:nvSpPr>
                 <p:cNvPr id="12" name="Freeform: Shape 11">
@@ -22778,8 +22526,8 @@
             </a:p>
           </p:txBody>
         </p:sp>
-        <mc:AlternateContent xmlns:mc="http://schemas.openxmlformats.org/markup-compatibility/2006">
-          <mc:Choice xmlns:a14="http://schemas.microsoft.com/office/drawing/2010/main" Requires="a14">
+        <mc:AlternateContent xmlns:mc="http://schemas.openxmlformats.org/markup-compatibility/2006" xmlns:a14="http://schemas.microsoft.com/office/drawing/2010/main">
+          <mc:Choice Requires="a14">
             <p:sp>
               <p:nvSpPr>
                 <p:cNvPr id="18" name="Freeform: Shape 17">
@@ -22968,7 +22716,7 @@
               </p:txBody>
             </p:sp>
           </mc:Choice>
-          <mc:Fallback>
+          <mc:Fallback xmlns="">
             <p:sp>
               <p:nvSpPr>
                 <p:cNvPr id="18" name="Freeform: Shape 17">

</xml_diff>